<commit_message>
Finished method anatomy slide
</commit_message>
<xml_diff>
--- a/Documentation/Examples.pptx
+++ b/Documentation/Examples.pptx
@@ -3395,7 +3395,11 @@
           <a:bodyPr/>
           <a:lstStyle/>
           <a:p>
-            <a:endParaRPr lang="en-US"/>
+            <a:r>
+              <a:rPr lang="en-US" dirty="0" smtClean="0"/>
+              <a:t>HAPPIL</a:t>
+            </a:r>
+            <a:endParaRPr lang="en-US" dirty="0"/>
           </a:p>
         </p:txBody>
       </p:sp>
@@ -3414,7 +3418,11 @@
           <a:bodyPr/>
           <a:lstStyle/>
           <a:p>
-            <a:endParaRPr lang="en-US"/>
+            <a:r>
+              <a:rPr lang="en-US" dirty="0" smtClean="0"/>
+              <a:t>Method Anatomy</a:t>
+            </a:r>
+            <a:endParaRPr lang="en-US" dirty="0"/>
           </a:p>
         </p:txBody>
       </p:sp>
@@ -3463,7 +3471,7 @@
         </p:nvSpPr>
         <p:spPr>
           <a:xfrm>
-            <a:off x="2257717" y="1428281"/>
+            <a:off x="7462477" y="1290345"/>
             <a:ext cx="5057483" cy="1866900"/>
           </a:xfrm>
           <a:prstGeom prst="roundRect">
@@ -3511,7 +3519,7 @@
         </p:nvSpPr>
         <p:spPr>
           <a:xfrm>
-            <a:off x="2372820" y="1428279"/>
+            <a:off x="7577580" y="1290343"/>
             <a:ext cx="4942358" cy="1569650"/>
           </a:xfrm>
           <a:prstGeom prst="rect">
@@ -3594,14 +3602,7 @@
                 <a:latin typeface="Consolas" pitchFamily="49" charset="0"/>
                 <a:cs typeface="Consolas" pitchFamily="49" charset="0"/>
               </a:rPr>
-              <a:t> </a:t>
-            </a:r>
-            <a:r>
-              <a:rPr lang="en-US" sz="2400" dirty="0">
-                <a:latin typeface="Consolas" pitchFamily="49" charset="0"/>
-                <a:cs typeface="Consolas" pitchFamily="49" charset="0"/>
-              </a:rPr>
-              <a:t>   return x + y;</a:t>
+              <a:t>    return x + y;</a:t>
             </a:r>
           </a:p>
           <a:p>
@@ -3623,7 +3624,7 @@
         </p:nvSpPr>
         <p:spPr>
           <a:xfrm>
-            <a:off x="6008950" y="2952281"/>
+            <a:off x="11213710" y="2814345"/>
             <a:ext cx="1292108" cy="368884"/>
           </a:xfrm>
           <a:prstGeom prst="roundRect">
@@ -3689,7 +3690,7 @@
         </p:nvSpPr>
         <p:spPr>
           <a:xfrm>
-            <a:off x="4963620" y="838201"/>
+            <a:off x="10168380" y="700265"/>
             <a:ext cx="914400" cy="1056716"/>
           </a:xfrm>
           <a:prstGeom prst="roundRect">
@@ -3738,7 +3739,7 @@
         </p:nvSpPr>
         <p:spPr>
           <a:xfrm>
-            <a:off x="5039820" y="838200"/>
+            <a:off x="10244580" y="700264"/>
             <a:ext cx="762000" cy="564103"/>
           </a:xfrm>
           <a:prstGeom prst="roundRect">
@@ -3866,15 +3867,6 @@
               </a:rPr>
               <a:t>&gt;</a:t>
             </a:r>
-            <a:endParaRPr lang="en-US" sz="1000" dirty="0">
-              <a:solidFill>
-                <a:schemeClr val="tx2">
-                  <a:lumMod val="75000"/>
-                </a:schemeClr>
-              </a:solidFill>
-              <a:latin typeface="Consolas" pitchFamily="49" charset="0"/>
-              <a:cs typeface="Consolas" pitchFamily="49" charset="0"/>
-            </a:endParaRPr>
           </a:p>
         </p:txBody>
       </p:sp>
@@ -3886,7 +3878,7 @@
         </p:nvSpPr>
         <p:spPr>
           <a:xfrm>
-            <a:off x="6106620" y="838201"/>
+            <a:off x="11311380" y="700265"/>
             <a:ext cx="914400" cy="1056716"/>
           </a:xfrm>
           <a:prstGeom prst="roundRect">
@@ -3935,7 +3927,7 @@
         </p:nvSpPr>
         <p:spPr>
           <a:xfrm>
-            <a:off x="6182820" y="838200"/>
+            <a:off x="11387580" y="700264"/>
             <a:ext cx="762000" cy="564103"/>
           </a:xfrm>
           <a:prstGeom prst="roundRect">
@@ -4063,15 +4055,6 @@
               </a:rPr>
               <a:t>&gt;</a:t>
             </a:r>
-            <a:endParaRPr lang="en-US" sz="1000" dirty="0">
-              <a:solidFill>
-                <a:schemeClr val="tx2">
-                  <a:lumMod val="75000"/>
-                </a:schemeClr>
-              </a:solidFill>
-              <a:latin typeface="Consolas" pitchFamily="49" charset="0"/>
-              <a:cs typeface="Consolas" pitchFamily="49" charset="0"/>
-            </a:endParaRPr>
           </a:p>
         </p:txBody>
       </p:sp>
@@ -4083,7 +4066,7 @@
         </p:nvSpPr>
         <p:spPr>
           <a:xfrm>
-            <a:off x="544326" y="2190279"/>
+            <a:off x="5749086" y="2052343"/>
             <a:ext cx="4826332" cy="415947"/>
           </a:xfrm>
           <a:prstGeom prst="roundRect">
@@ -4131,7 +4114,7 @@
         </p:nvSpPr>
         <p:spPr>
           <a:xfrm>
-            <a:off x="544325" y="2257229"/>
+            <a:off x="5749085" y="2119293"/>
             <a:ext cx="1676400" cy="282051"/>
           </a:xfrm>
           <a:prstGeom prst="roundRect">
@@ -4205,13 +4188,6 @@
               </a:rPr>
               <a:t>&gt;</a:t>
             </a:r>
-            <a:endParaRPr lang="en-US" sz="1000" dirty="0">
-              <a:solidFill>
-                <a:srgbClr val="CC6600"/>
-              </a:solidFill>
-              <a:latin typeface="Consolas" pitchFamily="49" charset="0"/>
-              <a:cs typeface="Consolas" pitchFamily="49" charset="0"/>
-            </a:endParaRPr>
           </a:p>
         </p:txBody>
       </p:sp>
@@ -4223,7 +4199,7 @@
         </p:nvSpPr>
         <p:spPr>
           <a:xfrm>
-            <a:off x="4227340" y="1961681"/>
+            <a:off x="9432100" y="1823745"/>
             <a:ext cx="1016319" cy="2667000"/>
           </a:xfrm>
           <a:prstGeom prst="roundRect">
@@ -4271,7 +4247,7 @@
         </p:nvSpPr>
         <p:spPr>
           <a:xfrm>
-            <a:off x="4089444" y="1898061"/>
+            <a:off x="9294204" y="1760125"/>
             <a:ext cx="1292108" cy="368884"/>
           </a:xfrm>
           <a:prstGeom prst="roundRect">
@@ -4333,7 +4309,7 @@
         </p:nvSpPr>
         <p:spPr>
           <a:xfrm>
-            <a:off x="4011757" y="3961347"/>
+            <a:off x="9216517" y="3823411"/>
             <a:ext cx="1447800" cy="673684"/>
           </a:xfrm>
           <a:prstGeom prst="roundRect">
@@ -4464,13 +4440,6 @@
               </a:rPr>
               <a:t>&gt;</a:t>
             </a:r>
-            <a:endParaRPr lang="en-US" sz="1000" dirty="0">
-              <a:solidFill>
-                <a:srgbClr val="0070C0"/>
-              </a:solidFill>
-              <a:latin typeface="Consolas" pitchFamily="49" charset="0"/>
-              <a:cs typeface="Consolas" pitchFamily="49" charset="0"/>
-            </a:endParaRPr>
           </a:p>
         </p:txBody>
       </p:sp>
@@ -4482,7 +4451,7 @@
         </p:nvSpPr>
         <p:spPr>
           <a:xfrm>
-            <a:off x="4278298" y="2266482"/>
+            <a:off x="9483058" y="2128546"/>
             <a:ext cx="279560" cy="444973"/>
           </a:xfrm>
           <a:prstGeom prst="roundRect">
@@ -4533,7 +4502,7 @@
         </p:nvCxnSpPr>
         <p:spPr>
           <a:xfrm rot="5400000" flipH="1" flipV="1">
-            <a:off x="4511181" y="1801816"/>
+            <a:off x="9715941" y="1663880"/>
             <a:ext cx="816537" cy="1002743"/>
           </a:xfrm>
           <a:prstGeom prst="bentConnector3">
@@ -4565,7 +4534,7 @@
         </p:nvSpPr>
         <p:spPr>
           <a:xfrm>
-            <a:off x="4919448" y="2266946"/>
+            <a:off x="10124208" y="2129010"/>
             <a:ext cx="279560" cy="444973"/>
           </a:xfrm>
           <a:prstGeom prst="roundRect">
@@ -4616,7 +4585,7 @@
         </p:nvCxnSpPr>
         <p:spPr>
           <a:xfrm rot="5400000" flipH="1" flipV="1">
-            <a:off x="5403024" y="1551122"/>
+            <a:off x="10607784" y="1413186"/>
             <a:ext cx="817001" cy="1504593"/>
           </a:xfrm>
           <a:prstGeom prst="bentConnector3">
@@ -4648,7 +4617,7 @@
         </p:nvSpPr>
         <p:spPr>
           <a:xfrm>
-            <a:off x="4601721" y="2266945"/>
+            <a:off x="9806481" y="2129009"/>
             <a:ext cx="279560" cy="1599736"/>
           </a:xfrm>
           <a:prstGeom prst="roundRect">
@@ -4696,7 +4665,7 @@
         </p:nvSpPr>
         <p:spPr>
           <a:xfrm rot="16200000">
-            <a:off x="4009495" y="3087309"/>
+            <a:off x="9214255" y="2949373"/>
             <a:ext cx="1466504" cy="282051"/>
           </a:xfrm>
           <a:prstGeom prst="roundRect">
@@ -4770,13 +4739,6 @@
               </a:rPr>
               <a:t>&gt;</a:t>
             </a:r>
-            <a:endParaRPr lang="en-US" sz="1000" dirty="0">
-              <a:solidFill>
-                <a:srgbClr val="009900"/>
-              </a:solidFill>
-              <a:latin typeface="Consolas" pitchFamily="49" charset="0"/>
-              <a:cs typeface="Consolas" pitchFamily="49" charset="0"/>
-            </a:endParaRPr>
           </a:p>
         </p:txBody>
       </p:sp>
@@ -4788,7 +4750,7 @@
         </p:nvSpPr>
         <p:spPr>
           <a:xfrm>
-            <a:off x="533400" y="5544346"/>
+            <a:off x="304800" y="838200"/>
             <a:ext cx="2062282" cy="346075"/>
           </a:xfrm>
           <a:prstGeom prst="roundRect">
@@ -4851,7 +4813,7 @@
         </p:nvSpPr>
         <p:spPr>
           <a:xfrm>
-            <a:off x="1038248" y="5995512"/>
+            <a:off x="809648" y="1289366"/>
             <a:ext cx="1557435" cy="265812"/>
           </a:xfrm>
           <a:prstGeom prst="roundRect">
@@ -4897,13 +4859,6 @@
               </a:rPr>
               <a:t>Arguments</a:t>
             </a:r>
-            <a:endParaRPr lang="en-US" sz="1200" b="1" dirty="0">
-              <a:solidFill>
-                <a:schemeClr val="tx1"/>
-              </a:solidFill>
-              <a:latin typeface="Consolas" pitchFamily="49" charset="0"/>
-              <a:cs typeface="Consolas" pitchFamily="49" charset="0"/>
-            </a:endParaRPr>
           </a:p>
         </p:txBody>
       </p:sp>
@@ -4915,7 +4870,7 @@
         </p:nvSpPr>
         <p:spPr>
           <a:xfrm>
-            <a:off x="1512400" y="6321552"/>
+            <a:off x="1283800" y="1615406"/>
             <a:ext cx="2221151" cy="243052"/>
           </a:xfrm>
           <a:prstGeom prst="roundRect">
@@ -5011,13 +4966,6 @@
               </a:rPr>
               <a:t>&gt;</a:t>
             </a:r>
-            <a:endParaRPr lang="en-US" sz="1200" b="1" dirty="0">
-              <a:solidFill>
-                <a:schemeClr val="tx1"/>
-              </a:solidFill>
-              <a:latin typeface="Consolas" pitchFamily="49" charset="0"/>
-              <a:cs typeface="Consolas" pitchFamily="49" charset="0"/>
-            </a:endParaRPr>
           </a:p>
         </p:txBody>
       </p:sp>
@@ -5029,7 +4977,7 @@
         </p:nvSpPr>
         <p:spPr>
           <a:xfrm>
-            <a:off x="1512399" y="6617056"/>
+            <a:off x="1283799" y="1910910"/>
             <a:ext cx="2221151" cy="243052"/>
           </a:xfrm>
           <a:prstGeom prst="roundRect">
@@ -5135,13 +5083,6 @@
               </a:rPr>
               <a:t>&gt;</a:t>
             </a:r>
-            <a:endParaRPr lang="en-US" sz="1200" b="1" dirty="0">
-              <a:solidFill>
-                <a:schemeClr val="tx1"/>
-              </a:solidFill>
-              <a:latin typeface="Consolas" pitchFamily="49" charset="0"/>
-              <a:cs typeface="Consolas" pitchFamily="49" charset="0"/>
-            </a:endParaRPr>
           </a:p>
         </p:txBody>
       </p:sp>
@@ -5153,7 +5094,7 @@
         </p:nvSpPr>
         <p:spPr>
           <a:xfrm>
-            <a:off x="1046678" y="6957221"/>
+            <a:off x="818078" y="2251075"/>
             <a:ext cx="1549006" cy="265021"/>
           </a:xfrm>
           <a:prstGeom prst="roundRect">
@@ -5198,13 +5139,6 @@
               </a:rPr>
               <a:t>Statements</a:t>
             </a:r>
-            <a:endParaRPr lang="en-US" sz="1200" b="1" dirty="0">
-              <a:solidFill>
-                <a:schemeClr val="tx1"/>
-              </a:solidFill>
-              <a:latin typeface="Consolas" pitchFamily="49" charset="0"/>
-              <a:cs typeface="Consolas" pitchFamily="49" charset="0"/>
-            </a:endParaRPr>
           </a:p>
         </p:txBody>
       </p:sp>
@@ -5216,7 +5150,7 @@
         </p:nvSpPr>
         <p:spPr>
           <a:xfrm>
-            <a:off x="1534592" y="7297475"/>
+            <a:off x="1305992" y="2591329"/>
             <a:ext cx="3190285" cy="265021"/>
           </a:xfrm>
           <a:prstGeom prst="roundRect">
@@ -5311,13 +5245,6 @@
               </a:rPr>
               <a:t>&gt;</a:t>
             </a:r>
-            <a:endParaRPr lang="en-US" sz="1200" b="1" dirty="0">
-              <a:solidFill>
-                <a:schemeClr val="tx1"/>
-              </a:solidFill>
-              <a:latin typeface="Consolas" pitchFamily="49" charset="0"/>
-              <a:cs typeface="Consolas" pitchFamily="49" charset="0"/>
-            </a:endParaRPr>
           </a:p>
         </p:txBody>
       </p:sp>
@@ -5329,7 +5256,7 @@
         </p:nvSpPr>
         <p:spPr>
           <a:xfrm>
-            <a:off x="2093696" y="7651785"/>
+            <a:off x="1865096" y="2945639"/>
             <a:ext cx="4002304" cy="262161"/>
           </a:xfrm>
           <a:prstGeom prst="roundRect">
@@ -5434,13 +5361,6 @@
               </a:rPr>
               <a:t>&gt;</a:t>
             </a:r>
-            <a:endParaRPr lang="en-US" sz="1200" b="1" dirty="0">
-              <a:solidFill>
-                <a:schemeClr val="tx1"/>
-              </a:solidFill>
-              <a:latin typeface="Consolas" pitchFamily="49" charset="0"/>
-              <a:cs typeface="Consolas" pitchFamily="49" charset="0"/>
-            </a:endParaRPr>
           </a:p>
         </p:txBody>
       </p:sp>
@@ -5452,7 +5372,7 @@
         </p:nvSpPr>
         <p:spPr>
           <a:xfrm>
-            <a:off x="2517044" y="7982746"/>
+            <a:off x="2288444" y="3276600"/>
             <a:ext cx="2435957" cy="243052"/>
           </a:xfrm>
           <a:prstGeom prst="roundRect">
@@ -5548,13 +5468,6 @@
               </a:rPr>
               <a:t>&gt;</a:t>
             </a:r>
-            <a:endParaRPr lang="en-US" sz="1200" b="1" dirty="0">
-              <a:solidFill>
-                <a:schemeClr val="tx1"/>
-              </a:solidFill>
-              <a:latin typeface="Consolas" pitchFamily="49" charset="0"/>
-              <a:cs typeface="Consolas" pitchFamily="49" charset="0"/>
-            </a:endParaRPr>
           </a:p>
         </p:txBody>
       </p:sp>
@@ -5566,7 +5479,7 @@
         </p:nvSpPr>
         <p:spPr>
           <a:xfrm>
-            <a:off x="2503726" y="8596148"/>
+            <a:off x="2275126" y="3890002"/>
             <a:ext cx="2449274" cy="243052"/>
           </a:xfrm>
           <a:prstGeom prst="roundRect">
@@ -5662,13 +5575,6 @@
               </a:rPr>
               <a:t>&gt;</a:t>
             </a:r>
-            <a:endParaRPr lang="en-US" sz="1200" b="1" dirty="0">
-              <a:solidFill>
-                <a:schemeClr val="tx1"/>
-              </a:solidFill>
-              <a:latin typeface="Consolas" pitchFamily="49" charset="0"/>
-              <a:cs typeface="Consolas" pitchFamily="49" charset="0"/>
-            </a:endParaRPr>
           </a:p>
         </p:txBody>
       </p:sp>
@@ -5680,7 +5586,7 @@
         </p:nvSpPr>
         <p:spPr>
           <a:xfrm>
-            <a:off x="2517043" y="8282964"/>
+            <a:off x="2288443" y="3576818"/>
             <a:ext cx="3578957" cy="243052"/>
           </a:xfrm>
           <a:prstGeom prst="roundRect">
@@ -5775,13 +5681,6 @@
               </a:rPr>
               <a:t>&gt;</a:t>
             </a:r>
-            <a:endParaRPr lang="en-US" sz="1200" b="1" dirty="0">
-              <a:solidFill>
-                <a:schemeClr val="tx1"/>
-              </a:solidFill>
-              <a:latin typeface="Consolas" pitchFamily="49" charset="0"/>
-              <a:cs typeface="Consolas" pitchFamily="49" charset="0"/>
-            </a:endParaRPr>
           </a:p>
         </p:txBody>
       </p:sp>
@@ -5795,7 +5694,7 @@
         </p:nvCxnSpPr>
         <p:spPr>
           <a:xfrm rot="16200000" flipH="1">
-            <a:off x="1282655" y="6213331"/>
+            <a:off x="1054055" y="1507185"/>
             <a:ext cx="237997" cy="221494"/>
           </a:xfrm>
           <a:prstGeom prst="bentConnector2">
@@ -5827,7 +5726,7 @@
         </p:nvCxnSpPr>
         <p:spPr>
           <a:xfrm rot="16200000" flipH="1">
-            <a:off x="1163026" y="6389209"/>
+            <a:off x="934426" y="1683063"/>
             <a:ext cx="477255" cy="221491"/>
           </a:xfrm>
           <a:prstGeom prst="bentConnector2">
@@ -5859,7 +5758,7 @@
         </p:nvCxnSpPr>
         <p:spPr>
           <a:xfrm rot="16200000" flipH="1">
-            <a:off x="338639" y="6381694"/>
+            <a:off x="110039" y="1675548"/>
             <a:ext cx="1186891" cy="229184"/>
           </a:xfrm>
           <a:prstGeom prst="bentConnector2">
@@ -5896,7 +5795,7 @@
         </p:nvCxnSpPr>
         <p:spPr>
           <a:xfrm>
-            <a:off x="1313099" y="7222243"/>
+            <a:off x="1084499" y="2516097"/>
             <a:ext cx="221493" cy="207743"/>
           </a:xfrm>
           <a:prstGeom prst="bentConnector3">
@@ -5935,7 +5834,7 @@
         </p:nvCxnSpPr>
         <p:spPr>
           <a:xfrm>
-            <a:off x="1866139" y="7562497"/>
+            <a:off x="1637539" y="2856351"/>
             <a:ext cx="227556" cy="220369"/>
           </a:xfrm>
           <a:prstGeom prst="bentConnector3">
@@ -5974,7 +5873,7 @@
         </p:nvCxnSpPr>
         <p:spPr>
           <a:xfrm>
-            <a:off x="2276171" y="7913944"/>
+            <a:off x="2047571" y="3207798"/>
             <a:ext cx="240873" cy="190328"/>
           </a:xfrm>
           <a:prstGeom prst="bentConnector3">
@@ -6008,7 +5907,7 @@
         </p:nvCxnSpPr>
         <p:spPr>
           <a:xfrm rot="16200000" flipH="1">
-            <a:off x="2151331" y="8038781"/>
+            <a:off x="1922731" y="3332635"/>
             <a:ext cx="490547" cy="240872"/>
           </a:xfrm>
           <a:prstGeom prst="bentConnector2">
@@ -6045,7 +5944,7 @@
         </p:nvCxnSpPr>
         <p:spPr>
           <a:xfrm rot="16200000" flipH="1">
-            <a:off x="1988685" y="8202636"/>
+            <a:off x="1760085" y="3496490"/>
             <a:ext cx="803731" cy="226347"/>
           </a:xfrm>
           <a:prstGeom prst="bentConnector2">
@@ -6077,7 +5976,7 @@
         </p:nvCxnSpPr>
         <p:spPr>
           <a:xfrm rot="16200000" flipH="1">
-            <a:off x="808500" y="5898674"/>
+            <a:off x="579900" y="1192528"/>
             <a:ext cx="237999" cy="221494"/>
           </a:xfrm>
           <a:prstGeom prst="bentConnector2">
@@ -6107,7 +6006,7 @@
         </p:nvSpPr>
         <p:spPr>
           <a:xfrm>
-            <a:off x="846713" y="7647442"/>
+            <a:off x="618113" y="2941296"/>
             <a:ext cx="1134534" cy="205763"/>
           </a:xfrm>
           <a:prstGeom prst="roundRect">
@@ -6169,7 +6068,7 @@
         </p:nvSpPr>
         <p:spPr>
           <a:xfrm>
-            <a:off x="1295052" y="7991554"/>
+            <a:off x="1066452" y="3285408"/>
             <a:ext cx="1045510" cy="205763"/>
           </a:xfrm>
           <a:prstGeom prst="roundRect">
@@ -6215,15 +6114,6 @@
               </a:rPr>
               <a:t>Left</a:t>
             </a:r>
-            <a:endParaRPr lang="en-US" sz="1000" dirty="0">
-              <a:solidFill>
-                <a:schemeClr val="accent6">
-                  <a:lumMod val="75000"/>
-                </a:schemeClr>
-              </a:solidFill>
-              <a:latin typeface="Consolas" pitchFamily="49" charset="0"/>
-              <a:cs typeface="Consolas" pitchFamily="49" charset="0"/>
-            </a:endParaRPr>
           </a:p>
         </p:txBody>
       </p:sp>
@@ -6235,7 +6125,7 @@
         </p:nvSpPr>
         <p:spPr>
           <a:xfrm>
-            <a:off x="1288923" y="8597357"/>
+            <a:off x="1060323" y="3891211"/>
             <a:ext cx="1045510" cy="205763"/>
           </a:xfrm>
           <a:prstGeom prst="roundRect">
@@ -6281,15 +6171,6 @@
               </a:rPr>
               <a:t>Right</a:t>
             </a:r>
-            <a:endParaRPr lang="en-US" sz="1000" dirty="0">
-              <a:solidFill>
-                <a:schemeClr val="accent6">
-                  <a:lumMod val="75000"/>
-                </a:schemeClr>
-              </a:solidFill>
-              <a:latin typeface="Consolas" pitchFamily="49" charset="0"/>
-              <a:cs typeface="Consolas" pitchFamily="49" charset="0"/>
-            </a:endParaRPr>
           </a:p>
         </p:txBody>
       </p:sp>
@@ -6301,7 +6182,7 @@
         </p:nvSpPr>
         <p:spPr>
           <a:xfrm>
-            <a:off x="1288923" y="8301608"/>
+            <a:off x="1060323" y="3595462"/>
             <a:ext cx="1045510" cy="205763"/>
           </a:xfrm>
           <a:prstGeom prst="roundRect">
@@ -6345,93 +6226,6 @@
               </a:rPr>
               <a:t>Operator</a:t>
             </a:r>
-            <a:endParaRPr lang="en-US" sz="1000" dirty="0">
-              <a:solidFill>
-                <a:srgbClr val="009900"/>
-              </a:solidFill>
-              <a:latin typeface="Consolas" pitchFamily="49" charset="0"/>
-              <a:cs typeface="Consolas" pitchFamily="49" charset="0"/>
-            </a:endParaRPr>
-          </a:p>
-        </p:txBody>
-      </p:sp>
-      <p:sp>
-        <p:nvSpPr>
-          <p:cNvPr id="5" name="TextBox 4"/>
-          <p:cNvSpPr txBox="1"/>
-          <p:nvPr/>
-        </p:nvSpPr>
-        <p:spPr>
-          <a:xfrm>
-            <a:off x="10439400" y="5812455"/>
-            <a:ext cx="2057400" cy="1523367"/>
-          </a:xfrm>
-          <a:prstGeom prst="rect">
-            <a:avLst/>
-          </a:prstGeom>
-          <a:noFill/>
-        </p:spPr>
-        <p:txBody>
-          <a:bodyPr wrap="none" rtlCol="0" anchor="ctr" anchorCtr="0">
-            <a:noAutofit/>
-          </a:bodyPr>
-          <a:lstStyle/>
-          <a:p>
-            <a:pPr>
-              <a:lnSpc>
-                <a:spcPct val="150000"/>
-              </a:lnSpc>
-            </a:pPr>
-            <a:r>
-              <a:rPr lang="en-US" sz="1400" b="1" dirty="0" smtClean="0">
-                <a:latin typeface="Consolas" pitchFamily="49" charset="0"/>
-                <a:cs typeface="Consolas" pitchFamily="49" charset="0"/>
-              </a:rPr>
-              <a:t>ldarg.1</a:t>
-            </a:r>
-            <a:br>
-              <a:rPr lang="en-US" sz="1400" b="1" dirty="0" smtClean="0">
-                <a:latin typeface="Consolas" pitchFamily="49" charset="0"/>
-                <a:cs typeface="Consolas" pitchFamily="49" charset="0"/>
-              </a:rPr>
-            </a:br>
-            <a:r>
-              <a:rPr lang="en-US" sz="1400" b="1" dirty="0" smtClean="0">
-                <a:latin typeface="Consolas" pitchFamily="49" charset="0"/>
-                <a:cs typeface="Consolas" pitchFamily="49" charset="0"/>
-              </a:rPr>
-              <a:t>ldarg.2</a:t>
-            </a:r>
-            <a:br>
-              <a:rPr lang="en-US" sz="1400" b="1" dirty="0" smtClean="0">
-                <a:latin typeface="Consolas" pitchFamily="49" charset="0"/>
-                <a:cs typeface="Consolas" pitchFamily="49" charset="0"/>
-              </a:rPr>
-            </a:br>
-            <a:r>
-              <a:rPr lang="en-US" sz="1400" b="1" dirty="0" smtClean="0">
-                <a:latin typeface="Consolas" pitchFamily="49" charset="0"/>
-                <a:cs typeface="Consolas" pitchFamily="49" charset="0"/>
-              </a:rPr>
-              <a:t>add</a:t>
-            </a:r>
-            <a:br>
-              <a:rPr lang="en-US" sz="1400" b="1" dirty="0" smtClean="0">
-                <a:latin typeface="Consolas" pitchFamily="49" charset="0"/>
-                <a:cs typeface="Consolas" pitchFamily="49" charset="0"/>
-              </a:rPr>
-            </a:br>
-            <a:r>
-              <a:rPr lang="en-US" sz="1400" b="1" dirty="0" smtClean="0">
-                <a:latin typeface="Consolas" pitchFamily="49" charset="0"/>
-                <a:cs typeface="Consolas" pitchFamily="49" charset="0"/>
-              </a:rPr>
-              <a:t>ret</a:t>
-            </a:r>
-            <a:endParaRPr lang="en-US" sz="1400" b="1" dirty="0">
-              <a:latin typeface="Consolas" pitchFamily="49" charset="0"/>
-              <a:cs typeface="Consolas" pitchFamily="49" charset="0"/>
-            </a:endParaRPr>
           </a:p>
         </p:txBody>
       </p:sp>
@@ -6444,14 +6238,14 @@
           <p:nvPr>
             <p:extLst>
               <p:ext uri="{D42A27DB-BD31-4B8C-83A1-F6EECF244321}">
-                <p14:modId xmlns:p14="http://schemas.microsoft.com/office/powerpoint/2010/main" val="3823945302"/>
+                <p14:modId xmlns:p14="http://schemas.microsoft.com/office/powerpoint/2010/main" val="498051202"/>
               </p:ext>
             </p:extLst>
           </p:nvPr>
         </p:nvGraphicFramePr>
         <p:xfrm>
-          <a:off x="6906720" y="5148807"/>
-          <a:ext cx="1828800" cy="2225040"/>
+          <a:off x="304800" y="4831080"/>
+          <a:ext cx="9677400" cy="3276600"/>
         </p:xfrm>
         <a:graphic>
           <a:graphicData uri="http://schemas.openxmlformats.org/drawingml/2006/table">
@@ -6460,20 +6254,22 @@
                 <a:tableStyleId>{BC89EF96-8CEA-46FF-86C4-4CE0E7609802}</a:tableStyleId>
               </a:tblPr>
               <a:tblGrid>
-                <a:gridCol w="914400"/>
+                <a:gridCol w="381000"/>
+                <a:gridCol w="7391400"/>
+                <a:gridCol w="990600"/>
                 <a:gridCol w="914400"/>
               </a:tblGrid>
-              <a:tr h="370840">
+              <a:tr h="213360">
                 <a:tc>
                   <a:txBody>
                     <a:bodyPr/>
                     <a:lstStyle/>
                     <a:p>
                       <a:r>
-                        <a:rPr lang="en-US" sz="1200" dirty="0" smtClean="0"/>
-                        <a:t>Object</a:t>
-                      </a:r>
-                      <a:endParaRPr lang="en-US" sz="1200" dirty="0"/>
+                        <a:rPr lang="en-US" sz="1100" dirty="0" smtClean="0"/>
+                        <a:t>#</a:t>
+                      </a:r>
+                      <a:endParaRPr lang="en-US" sz="1100" dirty="0"/>
                     </a:p>
                   </a:txBody>
                   <a:tcPr/>
@@ -6484,22 +6280,10 @@
                     <a:lstStyle/>
                     <a:p>
                       <a:r>
-                        <a:rPr lang="en-US" sz="1200" dirty="0" smtClean="0"/>
-                        <a:t>Method</a:t>
-                      </a:r>
-                      <a:endParaRPr lang="en-US" sz="1200" dirty="0"/>
-                    </a:p>
-                  </a:txBody>
-                  <a:tcPr/>
-                </a:tc>
-              </a:tr>
-              <a:tr h="370840">
-                <a:tc>
-                  <a:txBody>
-                    <a:bodyPr/>
-                    <a:lstStyle/>
-                    <a:p>
-                      <a:endParaRPr lang="en-US" sz="1200" dirty="0"/>
+                        <a:rPr lang="en-US" sz="1100" dirty="0" smtClean="0"/>
+                        <a:t>Object</a:t>
+                      </a:r>
+                      <a:endParaRPr lang="en-US" sz="1100" dirty="0"/>
                     </a:p>
                   </a:txBody>
                   <a:tcPr/>
@@ -6509,19 +6293,11 @@
                     <a:bodyPr/>
                     <a:lstStyle/>
                     <a:p>
-                      <a:endParaRPr lang="en-US" sz="1200"/>
-                    </a:p>
-                  </a:txBody>
-                  <a:tcPr/>
-                </a:tc>
-              </a:tr>
-              <a:tr h="370840">
-                <a:tc>
-                  <a:txBody>
-                    <a:bodyPr/>
-                    <a:lstStyle/>
-                    <a:p>
-                      <a:endParaRPr lang="en-US" sz="1200"/>
+                      <a:r>
+                        <a:rPr lang="en-US" sz="1100" dirty="0" smtClean="0"/>
+                        <a:t>Emit Action</a:t>
+                      </a:r>
+                      <a:endParaRPr lang="en-US" sz="1100" dirty="0"/>
                     </a:p>
                   </a:txBody>
                   <a:tcPr/>
@@ -6531,19 +6307,39 @@
                     <a:bodyPr/>
                     <a:lstStyle/>
                     <a:p>
-                      <a:endParaRPr lang="en-US" sz="1200"/>
+                      <a:r>
+                        <a:rPr lang="en-US" sz="1100" dirty="0" smtClean="0"/>
+                        <a:t>Emitted IL</a:t>
+                      </a:r>
+                      <a:endParaRPr lang="en-US" sz="1100" dirty="0"/>
                     </a:p>
                   </a:txBody>
                   <a:tcPr/>
                 </a:tc>
               </a:tr>
-              <a:tr h="370840">
+              <a:tr h="274320">
                 <a:tc>
                   <a:txBody>
                     <a:bodyPr/>
                     <a:lstStyle/>
                     <a:p>
-                      <a:endParaRPr lang="en-US" sz="1200"/>
+                      <a:r>
+                        <a:rPr lang="en-US" sz="1100" b="0" dirty="0" smtClean="0">
+                          <a:solidFill>
+                            <a:schemeClr val="tx1"/>
+                          </a:solidFill>
+                          <a:latin typeface="+mj-lt"/>
+                          <a:cs typeface="Consolas" pitchFamily="49" charset="0"/>
+                        </a:rPr>
+                        <a:t>1</a:t>
+                      </a:r>
+                      <a:endParaRPr lang="en-US" sz="1100" b="0" dirty="0">
+                        <a:solidFill>
+                          <a:schemeClr val="tx1"/>
+                        </a:solidFill>
+                        <a:latin typeface="+mj-lt"/>
+                        <a:cs typeface="Consolas" pitchFamily="49" charset="0"/>
+                      </a:endParaRPr>
                     </a:p>
                   </a:txBody>
                   <a:tcPr/>
@@ -6553,19 +6349,23 @@
                     <a:bodyPr/>
                     <a:lstStyle/>
                     <a:p>
-                      <a:endParaRPr lang="en-US" sz="1200"/>
-                    </a:p>
-                  </a:txBody>
-                  <a:tcPr/>
-                </a:tc>
-              </a:tr>
-              <a:tr h="370840">
-                <a:tc>
-                  <a:txBody>
-                    <a:bodyPr/>
-                    <a:lstStyle/>
-                    <a:p>
-                      <a:endParaRPr lang="en-US" sz="1200"/>
+                      <a:r>
+                        <a:rPr lang="en-US" sz="1100" b="0" dirty="0" err="1" smtClean="0">
+                          <a:solidFill>
+                            <a:srgbClr val="C00000"/>
+                          </a:solidFill>
+                          <a:latin typeface="Consolas" pitchFamily="49" charset="0"/>
+                          <a:cs typeface="Consolas" pitchFamily="49" charset="0"/>
+                        </a:rPr>
+                        <a:t>HappilMethod</a:t>
+                      </a:r>
+                      <a:endParaRPr lang="en-US" sz="1100" b="0" dirty="0">
+                        <a:solidFill>
+                          <a:srgbClr val="C00000"/>
+                        </a:solidFill>
+                        <a:latin typeface="Consolas" pitchFamily="49" charset="0"/>
+                        <a:cs typeface="Consolas" pitchFamily="49" charset="0"/>
+                      </a:endParaRPr>
                     </a:p>
                   </a:txBody>
                   <a:tcPr/>
@@ -6575,19 +6375,17 @@
                     <a:bodyPr/>
                     <a:lstStyle/>
                     <a:p>
-                      <a:endParaRPr lang="en-US" sz="1200"/>
-                    </a:p>
-                  </a:txBody>
-                  <a:tcPr/>
-                </a:tc>
-              </a:tr>
-              <a:tr h="370840">
-                <a:tc>
-                  <a:txBody>
-                    <a:bodyPr/>
-                    <a:lstStyle/>
-                    <a:p>
-                      <a:endParaRPr lang="en-US" sz="1200" dirty="0"/>
+                      <a:r>
+                        <a:rPr lang="en-US" sz="1100" b="0" dirty="0" err="1" smtClean="0">
+                          <a:latin typeface="Consolas" pitchFamily="49" charset="0"/>
+                          <a:cs typeface="Consolas" pitchFamily="49" charset="0"/>
+                        </a:rPr>
+                        <a:t>EmitBody</a:t>
+                      </a:r>
+                      <a:endParaRPr lang="en-US" sz="1100" b="0" dirty="0">
+                        <a:latin typeface="Consolas" pitchFamily="49" charset="0"/>
+                        <a:cs typeface="Consolas" pitchFamily="49" charset="0"/>
+                      </a:endParaRPr>
                     </a:p>
                   </a:txBody>
                   <a:tcPr/>
@@ -6597,7 +6395,2061 @@
                     <a:bodyPr/>
                     <a:lstStyle/>
                     <a:p>
-                      <a:endParaRPr lang="en-US" sz="1200" dirty="0"/>
+                      <a:r>
+                        <a:rPr lang="en-US" sz="1100" b="1" dirty="0" smtClean="0">
+                          <a:latin typeface="Consolas" pitchFamily="49" charset="0"/>
+                          <a:cs typeface="Consolas" pitchFamily="49" charset="0"/>
+                        </a:rPr>
+                        <a:t>-</a:t>
+                      </a:r>
+                      <a:endParaRPr lang="en-US" sz="1100" b="1" dirty="0">
+                        <a:latin typeface="Consolas" pitchFamily="49" charset="0"/>
+                        <a:cs typeface="Consolas" pitchFamily="49" charset="0"/>
+                      </a:endParaRPr>
+                    </a:p>
+                  </a:txBody>
+                  <a:tcPr/>
+                </a:tc>
+              </a:tr>
+              <a:tr h="274320">
+                <a:tc>
+                  <a:txBody>
+                    <a:bodyPr/>
+                    <a:lstStyle/>
+                    <a:p>
+                      <a:pPr lvl="0"/>
+                      <a:r>
+                        <a:rPr lang="en-US" sz="1100" b="0" dirty="0" smtClean="0">
+                          <a:solidFill>
+                            <a:schemeClr val="tx1"/>
+                          </a:solidFill>
+                          <a:latin typeface="+mj-lt"/>
+                          <a:cs typeface="Consolas" pitchFamily="49" charset="0"/>
+                        </a:rPr>
+                        <a:t>2</a:t>
+                      </a:r>
+                      <a:endParaRPr lang="en-US" sz="1100" b="0" dirty="0">
+                        <a:solidFill>
+                          <a:schemeClr val="tx1"/>
+                        </a:solidFill>
+                        <a:latin typeface="+mj-lt"/>
+                        <a:cs typeface="Consolas" pitchFamily="49" charset="0"/>
+                      </a:endParaRPr>
+                    </a:p>
+                  </a:txBody>
+                  <a:tcPr/>
+                </a:tc>
+                <a:tc>
+                  <a:txBody>
+                    <a:bodyPr/>
+                    <a:lstStyle/>
+                    <a:p>
+                      <a:pPr lvl="1"/>
+                      <a:r>
+                        <a:rPr lang="en-US" sz="1100" b="0" dirty="0" smtClean="0">
+                          <a:latin typeface="Consolas" pitchFamily="49" charset="0"/>
+                          <a:cs typeface="Consolas" pitchFamily="49" charset="0"/>
+                        </a:rPr>
+                        <a:t>Statements[0] : </a:t>
+                      </a:r>
+                      <a:r>
+                        <a:rPr lang="en-US" sz="1100" b="0" dirty="0" err="1" smtClean="0">
+                          <a:solidFill>
+                            <a:schemeClr val="bg1">
+                              <a:lumMod val="65000"/>
+                            </a:schemeClr>
+                          </a:solidFill>
+                          <a:latin typeface="Consolas" pitchFamily="49" charset="0"/>
+                          <a:cs typeface="Consolas" pitchFamily="49" charset="0"/>
+                        </a:rPr>
+                        <a:t>IHappilStatement</a:t>
+                      </a:r>
+                      <a:r>
+                        <a:rPr lang="en-US" sz="1100" b="0" dirty="0" smtClean="0">
+                          <a:solidFill>
+                            <a:schemeClr val="bg1">
+                              <a:lumMod val="65000"/>
+                            </a:schemeClr>
+                          </a:solidFill>
+                          <a:latin typeface="Consolas" pitchFamily="49" charset="0"/>
+                          <a:cs typeface="Consolas" pitchFamily="49" charset="0"/>
+                        </a:rPr>
+                        <a:t> </a:t>
+                      </a:r>
+                      <a:r>
+                        <a:rPr lang="en-US" sz="1100" b="0" dirty="0" smtClean="0">
+                          <a:solidFill>
+                            <a:schemeClr val="tx1">
+                              <a:lumMod val="50000"/>
+                              <a:lumOff val="50000"/>
+                            </a:schemeClr>
+                          </a:solidFill>
+                          <a:latin typeface="Consolas" pitchFamily="49" charset="0"/>
+                          <a:cs typeface="Consolas" pitchFamily="49" charset="0"/>
+                        </a:rPr>
+                        <a:t>{</a:t>
+                      </a:r>
+                      <a:r>
+                        <a:rPr lang="en-US" sz="1100" b="0" dirty="0" smtClean="0">
+                          <a:solidFill>
+                            <a:srgbClr val="C00000"/>
+                          </a:solidFill>
+                          <a:latin typeface="Consolas" pitchFamily="49" charset="0"/>
+                          <a:cs typeface="Consolas" pitchFamily="49" charset="0"/>
+                        </a:rPr>
+                        <a:t> </a:t>
+                      </a:r>
+                      <a:r>
+                        <a:rPr lang="en-US" sz="1100" b="0" dirty="0" err="1" smtClean="0">
+                          <a:solidFill>
+                            <a:srgbClr val="C00000"/>
+                          </a:solidFill>
+                          <a:latin typeface="Consolas" pitchFamily="49" charset="0"/>
+                          <a:cs typeface="Consolas" pitchFamily="49" charset="0"/>
+                        </a:rPr>
+                        <a:t>ReturnStatement</a:t>
+                      </a:r>
+                      <a:r>
+                        <a:rPr lang="en-US" sz="1100" b="0" dirty="0" smtClean="0">
+                          <a:solidFill>
+                            <a:srgbClr val="C00000"/>
+                          </a:solidFill>
+                          <a:latin typeface="Consolas" pitchFamily="49" charset="0"/>
+                          <a:cs typeface="Consolas" pitchFamily="49" charset="0"/>
+                        </a:rPr>
+                        <a:t> </a:t>
+                      </a:r>
+                      <a:r>
+                        <a:rPr lang="en-US" sz="1100" b="0" dirty="0" smtClean="0">
+                          <a:solidFill>
+                            <a:schemeClr val="tx1">
+                              <a:lumMod val="50000"/>
+                              <a:lumOff val="50000"/>
+                            </a:schemeClr>
+                          </a:solidFill>
+                          <a:latin typeface="Consolas" pitchFamily="49" charset="0"/>
+                          <a:cs typeface="Consolas" pitchFamily="49" charset="0"/>
+                        </a:rPr>
+                        <a:t>}</a:t>
+                      </a:r>
+                      <a:endParaRPr lang="en-US" sz="1100" b="0" dirty="0">
+                        <a:solidFill>
+                          <a:schemeClr val="tx1">
+                            <a:lumMod val="50000"/>
+                            <a:lumOff val="50000"/>
+                          </a:schemeClr>
+                        </a:solidFill>
+                        <a:latin typeface="Consolas" pitchFamily="49" charset="0"/>
+                        <a:cs typeface="Consolas" pitchFamily="49" charset="0"/>
+                      </a:endParaRPr>
+                    </a:p>
+                  </a:txBody>
+                  <a:tcPr/>
+                </a:tc>
+                <a:tc>
+                  <a:txBody>
+                    <a:bodyPr/>
+                    <a:lstStyle/>
+                    <a:p>
+                      <a:r>
+                        <a:rPr lang="en-US" sz="1100" b="0" dirty="0" smtClean="0">
+                          <a:latin typeface="Consolas" pitchFamily="49" charset="0"/>
+                          <a:cs typeface="Consolas" pitchFamily="49" charset="0"/>
+                        </a:rPr>
+                        <a:t>Emit </a:t>
+                      </a:r>
+                      <a:endParaRPr lang="en-US" sz="1100" b="0" dirty="0">
+                        <a:latin typeface="Consolas" pitchFamily="49" charset="0"/>
+                        <a:cs typeface="Consolas" pitchFamily="49" charset="0"/>
+                      </a:endParaRPr>
+                    </a:p>
+                  </a:txBody>
+                  <a:tcPr/>
+                </a:tc>
+                <a:tc>
+                  <a:txBody>
+                    <a:bodyPr/>
+                    <a:lstStyle/>
+                    <a:p>
+                      <a:r>
+                        <a:rPr lang="en-US" sz="1100" b="1" dirty="0" smtClean="0">
+                          <a:latin typeface="Consolas" pitchFamily="49" charset="0"/>
+                          <a:cs typeface="Consolas" pitchFamily="49" charset="0"/>
+                        </a:rPr>
+                        <a:t>-</a:t>
+                      </a:r>
+                      <a:endParaRPr lang="en-US" sz="1100" b="1" dirty="0">
+                        <a:latin typeface="Consolas" pitchFamily="49" charset="0"/>
+                        <a:cs typeface="Consolas" pitchFamily="49" charset="0"/>
+                      </a:endParaRPr>
+                    </a:p>
+                  </a:txBody>
+                  <a:tcPr/>
+                </a:tc>
+              </a:tr>
+              <a:tr h="274320">
+                <a:tc>
+                  <a:txBody>
+                    <a:bodyPr/>
+                    <a:lstStyle/>
+                    <a:p>
+                      <a:pPr lvl="0"/>
+                      <a:r>
+                        <a:rPr lang="en-US" sz="1100" b="0" dirty="0" smtClean="0">
+                          <a:solidFill>
+                            <a:schemeClr val="tx1"/>
+                          </a:solidFill>
+                          <a:latin typeface="+mj-lt"/>
+                          <a:cs typeface="Consolas" pitchFamily="49" charset="0"/>
+                        </a:rPr>
+                        <a:t>3</a:t>
+                      </a:r>
+                      <a:endParaRPr lang="en-US" sz="1100" b="0" dirty="0">
+                        <a:solidFill>
+                          <a:schemeClr val="tx1"/>
+                        </a:solidFill>
+                        <a:latin typeface="+mj-lt"/>
+                        <a:cs typeface="Consolas" pitchFamily="49" charset="0"/>
+                      </a:endParaRPr>
+                    </a:p>
+                  </a:txBody>
+                  <a:tcPr/>
+                </a:tc>
+                <a:tc>
+                  <a:txBody>
+                    <a:bodyPr/>
+                    <a:lstStyle/>
+                    <a:p>
+                      <a:pPr lvl="2"/>
+                      <a:r>
+                        <a:rPr lang="en-US" sz="1100" b="0" dirty="0" err="1" smtClean="0">
+                          <a:latin typeface="Consolas" pitchFamily="49" charset="0"/>
+                          <a:cs typeface="Consolas" pitchFamily="49" charset="0"/>
+                        </a:rPr>
+                        <a:t>ReturnValue</a:t>
+                      </a:r>
+                      <a:r>
+                        <a:rPr lang="en-US" sz="1100" b="0" dirty="0" smtClean="0">
+                          <a:latin typeface="Consolas" pitchFamily="49" charset="0"/>
+                          <a:cs typeface="Consolas" pitchFamily="49" charset="0"/>
+                        </a:rPr>
+                        <a:t> : </a:t>
+                      </a:r>
+                      <a:r>
+                        <a:rPr lang="en-US" sz="1100" b="0" dirty="0" err="1" smtClean="0">
+                          <a:solidFill>
+                            <a:schemeClr val="bg1">
+                              <a:lumMod val="65000"/>
+                            </a:schemeClr>
+                          </a:solidFill>
+                          <a:latin typeface="Consolas" pitchFamily="49" charset="0"/>
+                          <a:cs typeface="Consolas" pitchFamily="49" charset="0"/>
+                        </a:rPr>
+                        <a:t>IHappilOperand</a:t>
+                      </a:r>
+                      <a:r>
+                        <a:rPr lang="en-US" sz="1100" b="0" dirty="0" smtClean="0">
+                          <a:solidFill>
+                            <a:schemeClr val="bg1">
+                              <a:lumMod val="65000"/>
+                            </a:schemeClr>
+                          </a:solidFill>
+                          <a:latin typeface="Consolas" pitchFamily="49" charset="0"/>
+                          <a:cs typeface="Consolas" pitchFamily="49" charset="0"/>
+                        </a:rPr>
+                        <a:t>&lt;</a:t>
+                      </a:r>
+                      <a:r>
+                        <a:rPr lang="en-US" sz="1100" b="0" dirty="0" err="1" smtClean="0">
+                          <a:solidFill>
+                            <a:schemeClr val="bg1">
+                              <a:lumMod val="65000"/>
+                            </a:schemeClr>
+                          </a:solidFill>
+                          <a:latin typeface="Consolas" pitchFamily="49" charset="0"/>
+                          <a:cs typeface="Consolas" pitchFamily="49" charset="0"/>
+                        </a:rPr>
+                        <a:t>int</a:t>
+                      </a:r>
+                      <a:r>
+                        <a:rPr lang="en-US" sz="1100" b="0" dirty="0" smtClean="0">
+                          <a:solidFill>
+                            <a:schemeClr val="bg1">
+                              <a:lumMod val="65000"/>
+                            </a:schemeClr>
+                          </a:solidFill>
+                          <a:latin typeface="Consolas" pitchFamily="49" charset="0"/>
+                          <a:cs typeface="Consolas" pitchFamily="49" charset="0"/>
+                        </a:rPr>
+                        <a:t>&gt;</a:t>
+                      </a:r>
+                      <a:r>
+                        <a:rPr lang="en-US" sz="1100" b="0" baseline="0" dirty="0" smtClean="0">
+                          <a:solidFill>
+                            <a:schemeClr val="bg1">
+                              <a:lumMod val="65000"/>
+                            </a:schemeClr>
+                          </a:solidFill>
+                          <a:latin typeface="Consolas" pitchFamily="49" charset="0"/>
+                          <a:cs typeface="Consolas" pitchFamily="49" charset="0"/>
+                        </a:rPr>
+                        <a:t> </a:t>
+                      </a:r>
+                      <a:r>
+                        <a:rPr lang="en-US" sz="1100" b="0" baseline="0" dirty="0" smtClean="0">
+                          <a:solidFill>
+                            <a:schemeClr val="tx1">
+                              <a:lumMod val="50000"/>
+                              <a:lumOff val="50000"/>
+                            </a:schemeClr>
+                          </a:solidFill>
+                          <a:latin typeface="Consolas" pitchFamily="49" charset="0"/>
+                          <a:cs typeface="Consolas" pitchFamily="49" charset="0"/>
+                        </a:rPr>
+                        <a:t>{</a:t>
+                      </a:r>
+                      <a:r>
+                        <a:rPr lang="en-US" sz="1100" b="0" baseline="0" dirty="0" smtClean="0">
+                          <a:solidFill>
+                            <a:srgbClr val="C00000"/>
+                          </a:solidFill>
+                          <a:latin typeface="Consolas" pitchFamily="49" charset="0"/>
+                          <a:cs typeface="Consolas" pitchFamily="49" charset="0"/>
+                        </a:rPr>
+                        <a:t> </a:t>
+                      </a:r>
+                      <a:r>
+                        <a:rPr lang="en-US" sz="1100" b="0" dirty="0" err="1" smtClean="0">
+                          <a:solidFill>
+                            <a:srgbClr val="C00000"/>
+                          </a:solidFill>
+                          <a:latin typeface="Consolas" pitchFamily="49" charset="0"/>
+                          <a:cs typeface="Consolas" pitchFamily="49" charset="0"/>
+                        </a:rPr>
+                        <a:t>HappilBinaryExpression</a:t>
+                      </a:r>
+                      <a:r>
+                        <a:rPr lang="en-US" sz="1100" b="0" dirty="0" smtClean="0">
+                          <a:solidFill>
+                            <a:srgbClr val="C00000"/>
+                          </a:solidFill>
+                          <a:latin typeface="Consolas" pitchFamily="49" charset="0"/>
+                          <a:cs typeface="Consolas" pitchFamily="49" charset="0"/>
+                        </a:rPr>
+                        <a:t>&lt;</a:t>
+                      </a:r>
+                      <a:r>
+                        <a:rPr lang="en-US" sz="1100" b="0" dirty="0" err="1" smtClean="0">
+                          <a:solidFill>
+                            <a:srgbClr val="C00000"/>
+                          </a:solidFill>
+                          <a:latin typeface="Consolas" pitchFamily="49" charset="0"/>
+                          <a:cs typeface="Consolas" pitchFamily="49" charset="0"/>
+                        </a:rPr>
+                        <a:t>int,</a:t>
+                      </a:r>
+                      <a:r>
+                        <a:rPr lang="en-US" sz="1100" b="0" baseline="0" dirty="0" err="1" smtClean="0">
+                          <a:solidFill>
+                            <a:srgbClr val="C00000"/>
+                          </a:solidFill>
+                          <a:latin typeface="Consolas" pitchFamily="49" charset="0"/>
+                          <a:cs typeface="Consolas" pitchFamily="49" charset="0"/>
+                        </a:rPr>
+                        <a:t>int,int</a:t>
+                      </a:r>
+                      <a:r>
+                        <a:rPr lang="en-US" sz="1100" b="0" baseline="0" dirty="0" smtClean="0">
+                          <a:solidFill>
+                            <a:srgbClr val="C00000"/>
+                          </a:solidFill>
+                          <a:latin typeface="Consolas" pitchFamily="49" charset="0"/>
+                          <a:cs typeface="Consolas" pitchFamily="49" charset="0"/>
+                        </a:rPr>
+                        <a:t>&gt; </a:t>
+                      </a:r>
+                      <a:r>
+                        <a:rPr lang="en-US" sz="1100" b="0" baseline="0" dirty="0" smtClean="0">
+                          <a:solidFill>
+                            <a:schemeClr val="tx1">
+                              <a:lumMod val="50000"/>
+                              <a:lumOff val="50000"/>
+                            </a:schemeClr>
+                          </a:solidFill>
+                          <a:latin typeface="Consolas" pitchFamily="49" charset="0"/>
+                          <a:cs typeface="Consolas" pitchFamily="49" charset="0"/>
+                        </a:rPr>
+                        <a:t>}</a:t>
+                      </a:r>
+                      <a:endParaRPr lang="en-US" sz="1100" b="0" dirty="0">
+                        <a:solidFill>
+                          <a:schemeClr val="tx1">
+                            <a:lumMod val="50000"/>
+                            <a:lumOff val="50000"/>
+                          </a:schemeClr>
+                        </a:solidFill>
+                        <a:latin typeface="Consolas" pitchFamily="49" charset="0"/>
+                        <a:cs typeface="Consolas" pitchFamily="49" charset="0"/>
+                      </a:endParaRPr>
+                    </a:p>
+                  </a:txBody>
+                  <a:tcPr/>
+                </a:tc>
+                <a:tc>
+                  <a:txBody>
+                    <a:bodyPr/>
+                    <a:lstStyle/>
+                    <a:p>
+                      <a:r>
+                        <a:rPr lang="en-US" sz="1100" b="0" dirty="0" err="1" smtClean="0">
+                          <a:latin typeface="Consolas" pitchFamily="49" charset="0"/>
+                          <a:cs typeface="Consolas" pitchFamily="49" charset="0"/>
+                        </a:rPr>
+                        <a:t>EmitTarget</a:t>
+                      </a:r>
+                      <a:endParaRPr lang="en-US" sz="1100" b="0" dirty="0">
+                        <a:latin typeface="Consolas" pitchFamily="49" charset="0"/>
+                        <a:cs typeface="Consolas" pitchFamily="49" charset="0"/>
+                      </a:endParaRPr>
+                    </a:p>
+                  </a:txBody>
+                  <a:tcPr/>
+                </a:tc>
+                <a:tc>
+                  <a:txBody>
+                    <a:bodyPr/>
+                    <a:lstStyle/>
+                    <a:p>
+                      <a:r>
+                        <a:rPr lang="en-US" sz="1100" b="1" dirty="0" smtClean="0">
+                          <a:latin typeface="Consolas" pitchFamily="49" charset="0"/>
+                          <a:cs typeface="Consolas" pitchFamily="49" charset="0"/>
+                        </a:rPr>
+                        <a:t>-</a:t>
+                      </a:r>
+                      <a:endParaRPr lang="en-US" sz="1100" b="1" dirty="0">
+                        <a:latin typeface="Consolas" pitchFamily="49" charset="0"/>
+                        <a:cs typeface="Consolas" pitchFamily="49" charset="0"/>
+                      </a:endParaRPr>
+                    </a:p>
+                  </a:txBody>
+                  <a:tcPr/>
+                </a:tc>
+              </a:tr>
+              <a:tr h="274320">
+                <a:tc>
+                  <a:txBody>
+                    <a:bodyPr/>
+                    <a:lstStyle/>
+                    <a:p>
+                      <a:pPr lvl="0"/>
+                      <a:r>
+                        <a:rPr lang="en-US" sz="1100" b="0" dirty="0" smtClean="0">
+                          <a:solidFill>
+                            <a:schemeClr val="tx1"/>
+                          </a:solidFill>
+                          <a:latin typeface="+mj-lt"/>
+                          <a:cs typeface="Consolas" pitchFamily="49" charset="0"/>
+                        </a:rPr>
+                        <a:t>4</a:t>
+                      </a:r>
+                      <a:endParaRPr lang="en-US" sz="1100" b="0" dirty="0">
+                        <a:solidFill>
+                          <a:schemeClr val="tx1"/>
+                        </a:solidFill>
+                        <a:latin typeface="+mj-lt"/>
+                        <a:cs typeface="Consolas" pitchFamily="49" charset="0"/>
+                      </a:endParaRPr>
+                    </a:p>
+                  </a:txBody>
+                  <a:tcPr/>
+                </a:tc>
+                <a:tc>
+                  <a:txBody>
+                    <a:bodyPr/>
+                    <a:lstStyle/>
+                    <a:p>
+                      <a:pPr lvl="2"/>
+                      <a:r>
+                        <a:rPr lang="en-US" sz="1100" b="0" dirty="0" err="1" smtClean="0">
+                          <a:latin typeface="Consolas" pitchFamily="49" charset="0"/>
+                          <a:cs typeface="Consolas" pitchFamily="49" charset="0"/>
+                        </a:rPr>
+                        <a:t>ReturnValue</a:t>
+                      </a:r>
+                      <a:r>
+                        <a:rPr lang="en-US" sz="1100" b="0" dirty="0" smtClean="0">
+                          <a:latin typeface="Consolas" pitchFamily="49" charset="0"/>
+                          <a:cs typeface="Consolas" pitchFamily="49" charset="0"/>
+                        </a:rPr>
+                        <a:t> : </a:t>
+                      </a:r>
+                      <a:r>
+                        <a:rPr lang="en-US" sz="1100" b="0" dirty="0" err="1" smtClean="0">
+                          <a:solidFill>
+                            <a:schemeClr val="bg1">
+                              <a:lumMod val="65000"/>
+                            </a:schemeClr>
+                          </a:solidFill>
+                          <a:latin typeface="Consolas" pitchFamily="49" charset="0"/>
+                          <a:cs typeface="Consolas" pitchFamily="49" charset="0"/>
+                        </a:rPr>
+                        <a:t>IHappilOperand</a:t>
+                      </a:r>
+                      <a:r>
+                        <a:rPr lang="en-US" sz="1100" b="0" dirty="0" smtClean="0">
+                          <a:solidFill>
+                            <a:schemeClr val="bg1">
+                              <a:lumMod val="65000"/>
+                            </a:schemeClr>
+                          </a:solidFill>
+                          <a:latin typeface="Consolas" pitchFamily="49" charset="0"/>
+                          <a:cs typeface="Consolas" pitchFamily="49" charset="0"/>
+                        </a:rPr>
+                        <a:t>&lt;</a:t>
+                      </a:r>
+                      <a:r>
+                        <a:rPr lang="en-US" sz="1100" b="0" dirty="0" err="1" smtClean="0">
+                          <a:solidFill>
+                            <a:schemeClr val="bg1">
+                              <a:lumMod val="65000"/>
+                            </a:schemeClr>
+                          </a:solidFill>
+                          <a:latin typeface="Consolas" pitchFamily="49" charset="0"/>
+                          <a:cs typeface="Consolas" pitchFamily="49" charset="0"/>
+                        </a:rPr>
+                        <a:t>int</a:t>
+                      </a:r>
+                      <a:r>
+                        <a:rPr lang="en-US" sz="1100" b="0" dirty="0" smtClean="0">
+                          <a:solidFill>
+                            <a:schemeClr val="bg1">
+                              <a:lumMod val="65000"/>
+                            </a:schemeClr>
+                          </a:solidFill>
+                          <a:latin typeface="Consolas" pitchFamily="49" charset="0"/>
+                          <a:cs typeface="Consolas" pitchFamily="49" charset="0"/>
+                        </a:rPr>
+                        <a:t>&gt;</a:t>
+                      </a:r>
+                      <a:r>
+                        <a:rPr lang="en-US" sz="1100" b="0" baseline="0" dirty="0" smtClean="0">
+                          <a:solidFill>
+                            <a:schemeClr val="bg1">
+                              <a:lumMod val="65000"/>
+                            </a:schemeClr>
+                          </a:solidFill>
+                          <a:latin typeface="Consolas" pitchFamily="49" charset="0"/>
+                          <a:cs typeface="Consolas" pitchFamily="49" charset="0"/>
+                        </a:rPr>
+                        <a:t> </a:t>
+                      </a:r>
+                      <a:r>
+                        <a:rPr lang="en-US" sz="1100" b="0" baseline="0" dirty="0" smtClean="0">
+                          <a:solidFill>
+                            <a:schemeClr val="tx1">
+                              <a:lumMod val="50000"/>
+                              <a:lumOff val="50000"/>
+                            </a:schemeClr>
+                          </a:solidFill>
+                          <a:latin typeface="Consolas" pitchFamily="49" charset="0"/>
+                          <a:cs typeface="Consolas" pitchFamily="49" charset="0"/>
+                        </a:rPr>
+                        <a:t>{</a:t>
+                      </a:r>
+                      <a:r>
+                        <a:rPr lang="en-US" sz="1100" b="0" baseline="0" dirty="0" smtClean="0">
+                          <a:solidFill>
+                            <a:srgbClr val="C00000"/>
+                          </a:solidFill>
+                          <a:latin typeface="Consolas" pitchFamily="49" charset="0"/>
+                          <a:cs typeface="Consolas" pitchFamily="49" charset="0"/>
+                        </a:rPr>
+                        <a:t> </a:t>
+                      </a:r>
+                      <a:r>
+                        <a:rPr lang="en-US" sz="1100" b="0" dirty="0" err="1" smtClean="0">
+                          <a:solidFill>
+                            <a:srgbClr val="C00000"/>
+                          </a:solidFill>
+                          <a:latin typeface="Consolas" pitchFamily="49" charset="0"/>
+                          <a:cs typeface="Consolas" pitchFamily="49" charset="0"/>
+                        </a:rPr>
+                        <a:t>HappilBinaryExpression</a:t>
+                      </a:r>
+                      <a:r>
+                        <a:rPr lang="en-US" sz="1100" b="0" dirty="0" smtClean="0">
+                          <a:solidFill>
+                            <a:srgbClr val="C00000"/>
+                          </a:solidFill>
+                          <a:latin typeface="Consolas" pitchFamily="49" charset="0"/>
+                          <a:cs typeface="Consolas" pitchFamily="49" charset="0"/>
+                        </a:rPr>
+                        <a:t>&lt;</a:t>
+                      </a:r>
+                      <a:r>
+                        <a:rPr lang="en-US" sz="1100" b="0" dirty="0" err="1" smtClean="0">
+                          <a:solidFill>
+                            <a:srgbClr val="C00000"/>
+                          </a:solidFill>
+                          <a:latin typeface="Consolas" pitchFamily="49" charset="0"/>
+                          <a:cs typeface="Consolas" pitchFamily="49" charset="0"/>
+                        </a:rPr>
+                        <a:t>int,</a:t>
+                      </a:r>
+                      <a:r>
+                        <a:rPr lang="en-US" sz="1100" b="0" baseline="0" dirty="0" err="1" smtClean="0">
+                          <a:solidFill>
+                            <a:srgbClr val="C00000"/>
+                          </a:solidFill>
+                          <a:latin typeface="Consolas" pitchFamily="49" charset="0"/>
+                          <a:cs typeface="Consolas" pitchFamily="49" charset="0"/>
+                        </a:rPr>
+                        <a:t>int,int</a:t>
+                      </a:r>
+                      <a:r>
+                        <a:rPr lang="en-US" sz="1100" b="0" baseline="0" dirty="0" smtClean="0">
+                          <a:solidFill>
+                            <a:srgbClr val="C00000"/>
+                          </a:solidFill>
+                          <a:latin typeface="Consolas" pitchFamily="49" charset="0"/>
+                          <a:cs typeface="Consolas" pitchFamily="49" charset="0"/>
+                        </a:rPr>
+                        <a:t>&gt; </a:t>
+                      </a:r>
+                      <a:r>
+                        <a:rPr lang="en-US" sz="1100" b="0" baseline="0" dirty="0" smtClean="0">
+                          <a:solidFill>
+                            <a:schemeClr val="tx1">
+                              <a:lumMod val="50000"/>
+                              <a:lumOff val="50000"/>
+                            </a:schemeClr>
+                          </a:solidFill>
+                          <a:latin typeface="Consolas" pitchFamily="49" charset="0"/>
+                          <a:cs typeface="Consolas" pitchFamily="49" charset="0"/>
+                        </a:rPr>
+                        <a:t>}</a:t>
+                      </a:r>
+                      <a:endParaRPr lang="en-US" sz="1100" b="0" dirty="0">
+                        <a:solidFill>
+                          <a:schemeClr val="tx1">
+                            <a:lumMod val="50000"/>
+                            <a:lumOff val="50000"/>
+                          </a:schemeClr>
+                        </a:solidFill>
+                        <a:latin typeface="Consolas" pitchFamily="49" charset="0"/>
+                        <a:cs typeface="Consolas" pitchFamily="49" charset="0"/>
+                      </a:endParaRPr>
+                    </a:p>
+                  </a:txBody>
+                  <a:tcPr/>
+                </a:tc>
+                <a:tc>
+                  <a:txBody>
+                    <a:bodyPr/>
+                    <a:lstStyle/>
+                    <a:p>
+                      <a:r>
+                        <a:rPr lang="en-US" sz="1100" b="0" dirty="0" err="1" smtClean="0">
+                          <a:latin typeface="Consolas" pitchFamily="49" charset="0"/>
+                          <a:cs typeface="Consolas" pitchFamily="49" charset="0"/>
+                        </a:rPr>
+                        <a:t>EmitLoad</a:t>
+                      </a:r>
+                      <a:endParaRPr lang="en-US" sz="1100" b="0" dirty="0">
+                        <a:latin typeface="Consolas" pitchFamily="49" charset="0"/>
+                        <a:cs typeface="Consolas" pitchFamily="49" charset="0"/>
+                      </a:endParaRPr>
+                    </a:p>
+                  </a:txBody>
+                  <a:tcPr/>
+                </a:tc>
+                <a:tc>
+                  <a:txBody>
+                    <a:bodyPr/>
+                    <a:lstStyle/>
+                    <a:p>
+                      <a:r>
+                        <a:rPr lang="en-US" sz="1100" b="1" dirty="0" smtClean="0">
+                          <a:latin typeface="Consolas" pitchFamily="49" charset="0"/>
+                          <a:cs typeface="Consolas" pitchFamily="49" charset="0"/>
+                        </a:rPr>
+                        <a:t>-</a:t>
+                      </a:r>
+                      <a:endParaRPr lang="en-US" sz="1100" b="1" dirty="0">
+                        <a:latin typeface="Consolas" pitchFamily="49" charset="0"/>
+                        <a:cs typeface="Consolas" pitchFamily="49" charset="0"/>
+                      </a:endParaRPr>
+                    </a:p>
+                  </a:txBody>
+                  <a:tcPr/>
+                </a:tc>
+              </a:tr>
+              <a:tr h="274320">
+                <a:tc>
+                  <a:txBody>
+                    <a:bodyPr/>
+                    <a:lstStyle/>
+                    <a:p>
+                      <a:pPr lvl="0"/>
+                      <a:r>
+                        <a:rPr lang="en-US" sz="1100" b="0" dirty="0" smtClean="0">
+                          <a:solidFill>
+                            <a:schemeClr val="tx1"/>
+                          </a:solidFill>
+                          <a:latin typeface="+mj-lt"/>
+                          <a:cs typeface="Consolas" pitchFamily="49" charset="0"/>
+                        </a:rPr>
+                        <a:t>5</a:t>
+                      </a:r>
+                      <a:endParaRPr lang="en-US" sz="1100" b="0" dirty="0">
+                        <a:solidFill>
+                          <a:schemeClr val="tx1"/>
+                        </a:solidFill>
+                        <a:latin typeface="+mj-lt"/>
+                        <a:cs typeface="Consolas" pitchFamily="49" charset="0"/>
+                      </a:endParaRPr>
+                    </a:p>
+                  </a:txBody>
+                  <a:tcPr/>
+                </a:tc>
+                <a:tc>
+                  <a:txBody>
+                    <a:bodyPr/>
+                    <a:lstStyle/>
+                    <a:p>
+                      <a:pPr lvl="3"/>
+                      <a:r>
+                        <a:rPr lang="en-US" sz="1100" b="0" dirty="0" smtClean="0">
+                          <a:latin typeface="Consolas" pitchFamily="49" charset="0"/>
+                          <a:cs typeface="Consolas" pitchFamily="49" charset="0"/>
+                        </a:rPr>
+                        <a:t>Operator : </a:t>
+                      </a:r>
+                      <a:r>
+                        <a:rPr lang="en-US" sz="1100" b="0" dirty="0" err="1" smtClean="0">
+                          <a:solidFill>
+                            <a:schemeClr val="bg1">
+                              <a:lumMod val="65000"/>
+                            </a:schemeClr>
+                          </a:solidFill>
+                          <a:latin typeface="Consolas" pitchFamily="49" charset="0"/>
+                          <a:cs typeface="Consolas" pitchFamily="49" charset="0"/>
+                        </a:rPr>
+                        <a:t>IBinaryOperator</a:t>
+                      </a:r>
+                      <a:r>
+                        <a:rPr lang="en-US" sz="1100" b="0" dirty="0" smtClean="0">
+                          <a:solidFill>
+                            <a:schemeClr val="bg1">
+                              <a:lumMod val="65000"/>
+                            </a:schemeClr>
+                          </a:solidFill>
+                          <a:latin typeface="Consolas" pitchFamily="49" charset="0"/>
+                          <a:cs typeface="Consolas" pitchFamily="49" charset="0"/>
+                        </a:rPr>
+                        <a:t>&lt;</a:t>
+                      </a:r>
+                      <a:r>
+                        <a:rPr lang="en-US" sz="1100" b="0" dirty="0" err="1" smtClean="0">
+                          <a:solidFill>
+                            <a:schemeClr val="bg1">
+                              <a:lumMod val="65000"/>
+                            </a:schemeClr>
+                          </a:solidFill>
+                          <a:latin typeface="Consolas" pitchFamily="49" charset="0"/>
+                          <a:cs typeface="Consolas" pitchFamily="49" charset="0"/>
+                        </a:rPr>
+                        <a:t>int</a:t>
+                      </a:r>
+                      <a:r>
+                        <a:rPr lang="en-US" sz="1100" b="0" dirty="0" smtClean="0">
+                          <a:solidFill>
+                            <a:schemeClr val="bg1">
+                              <a:lumMod val="65000"/>
+                            </a:schemeClr>
+                          </a:solidFill>
+                          <a:latin typeface="Consolas" pitchFamily="49" charset="0"/>
+                          <a:cs typeface="Consolas" pitchFamily="49" charset="0"/>
+                        </a:rPr>
+                        <a:t>&gt; </a:t>
+                      </a:r>
+                      <a:r>
+                        <a:rPr lang="en-US" sz="1100" b="0" dirty="0" smtClean="0">
+                          <a:solidFill>
+                            <a:schemeClr val="tx1">
+                              <a:lumMod val="50000"/>
+                              <a:lumOff val="50000"/>
+                            </a:schemeClr>
+                          </a:solidFill>
+                          <a:latin typeface="Consolas" pitchFamily="49" charset="0"/>
+                          <a:cs typeface="Consolas" pitchFamily="49" charset="0"/>
+                        </a:rPr>
+                        <a:t>{</a:t>
+                      </a:r>
+                      <a:r>
+                        <a:rPr lang="en-US" sz="1100" b="0" dirty="0" smtClean="0">
+                          <a:solidFill>
+                            <a:srgbClr val="C00000"/>
+                          </a:solidFill>
+                          <a:latin typeface="Consolas" pitchFamily="49" charset="0"/>
+                          <a:cs typeface="Consolas" pitchFamily="49" charset="0"/>
+                        </a:rPr>
+                        <a:t> </a:t>
+                      </a:r>
+                      <a:r>
+                        <a:rPr lang="en-US" sz="1100" b="0" dirty="0" err="1" smtClean="0">
+                          <a:solidFill>
+                            <a:srgbClr val="C00000"/>
+                          </a:solidFill>
+                          <a:latin typeface="Consolas" pitchFamily="49" charset="0"/>
+                          <a:cs typeface="Consolas" pitchFamily="49" charset="0"/>
+                        </a:rPr>
+                        <a:t>BinaryOperators.OperatorAdd</a:t>
+                      </a:r>
+                      <a:r>
+                        <a:rPr lang="en-US" sz="1100" b="0" dirty="0" smtClean="0">
+                          <a:solidFill>
+                            <a:srgbClr val="C00000"/>
+                          </a:solidFill>
+                          <a:latin typeface="Consolas" pitchFamily="49" charset="0"/>
+                          <a:cs typeface="Consolas" pitchFamily="49" charset="0"/>
+                        </a:rPr>
+                        <a:t>&lt;</a:t>
+                      </a:r>
+                      <a:r>
+                        <a:rPr lang="en-US" sz="1100" b="0" dirty="0" err="1" smtClean="0">
+                          <a:solidFill>
+                            <a:srgbClr val="C00000"/>
+                          </a:solidFill>
+                          <a:latin typeface="Consolas" pitchFamily="49" charset="0"/>
+                          <a:cs typeface="Consolas" pitchFamily="49" charset="0"/>
+                        </a:rPr>
+                        <a:t>int</a:t>
+                      </a:r>
+                      <a:r>
+                        <a:rPr lang="en-US" sz="1100" b="0" dirty="0" smtClean="0">
+                          <a:solidFill>
+                            <a:srgbClr val="C00000"/>
+                          </a:solidFill>
+                          <a:latin typeface="Consolas" pitchFamily="49" charset="0"/>
+                          <a:cs typeface="Consolas" pitchFamily="49" charset="0"/>
+                        </a:rPr>
+                        <a:t>&gt; </a:t>
+                      </a:r>
+                      <a:r>
+                        <a:rPr lang="en-US" sz="1100" b="0" dirty="0" smtClean="0">
+                          <a:solidFill>
+                            <a:schemeClr val="tx1">
+                              <a:lumMod val="50000"/>
+                              <a:lumOff val="50000"/>
+                            </a:schemeClr>
+                          </a:solidFill>
+                          <a:latin typeface="Consolas" pitchFamily="49" charset="0"/>
+                          <a:cs typeface="Consolas" pitchFamily="49" charset="0"/>
+                        </a:rPr>
+                        <a:t>}</a:t>
+                      </a:r>
+                      <a:endParaRPr lang="en-US" sz="1100" b="0" dirty="0">
+                        <a:solidFill>
+                          <a:schemeClr val="tx1">
+                            <a:lumMod val="50000"/>
+                            <a:lumOff val="50000"/>
+                          </a:schemeClr>
+                        </a:solidFill>
+                        <a:latin typeface="Consolas" pitchFamily="49" charset="0"/>
+                        <a:cs typeface="Consolas" pitchFamily="49" charset="0"/>
+                      </a:endParaRPr>
+                    </a:p>
+                  </a:txBody>
+                  <a:tcPr/>
+                </a:tc>
+                <a:tc>
+                  <a:txBody>
+                    <a:bodyPr/>
+                    <a:lstStyle/>
+                    <a:p>
+                      <a:r>
+                        <a:rPr lang="en-US" sz="1100" b="0" dirty="0" smtClean="0">
+                          <a:latin typeface="Consolas" pitchFamily="49" charset="0"/>
+                          <a:cs typeface="Consolas" pitchFamily="49" charset="0"/>
+                        </a:rPr>
+                        <a:t>Emit </a:t>
+                      </a:r>
+                      <a:endParaRPr lang="en-US" sz="1100" b="0" dirty="0">
+                        <a:latin typeface="Consolas" pitchFamily="49" charset="0"/>
+                        <a:cs typeface="Consolas" pitchFamily="49" charset="0"/>
+                      </a:endParaRPr>
+                    </a:p>
+                  </a:txBody>
+                  <a:tcPr/>
+                </a:tc>
+                <a:tc>
+                  <a:txBody>
+                    <a:bodyPr/>
+                    <a:lstStyle/>
+                    <a:p>
+                      <a:r>
+                        <a:rPr lang="en-US" sz="1100" b="1" dirty="0" smtClean="0">
+                          <a:latin typeface="Consolas" pitchFamily="49" charset="0"/>
+                          <a:cs typeface="Consolas" pitchFamily="49" charset="0"/>
+                        </a:rPr>
+                        <a:t>-</a:t>
+                      </a:r>
+                      <a:endParaRPr lang="en-US" sz="1100" b="1" dirty="0">
+                        <a:latin typeface="Consolas" pitchFamily="49" charset="0"/>
+                        <a:cs typeface="Consolas" pitchFamily="49" charset="0"/>
+                      </a:endParaRPr>
+                    </a:p>
+                  </a:txBody>
+                  <a:tcPr/>
+                </a:tc>
+              </a:tr>
+              <a:tr h="274320">
+                <a:tc>
+                  <a:txBody>
+                    <a:bodyPr/>
+                    <a:lstStyle/>
+                    <a:p>
+                      <a:pPr lvl="0"/>
+                      <a:r>
+                        <a:rPr lang="en-US" sz="1100" b="0" dirty="0" smtClean="0">
+                          <a:solidFill>
+                            <a:schemeClr val="tx1"/>
+                          </a:solidFill>
+                          <a:latin typeface="+mj-lt"/>
+                          <a:cs typeface="Consolas" pitchFamily="49" charset="0"/>
+                        </a:rPr>
+                        <a:t>6</a:t>
+                      </a:r>
+                      <a:endParaRPr lang="en-US" sz="1100" b="0" dirty="0">
+                        <a:solidFill>
+                          <a:schemeClr val="tx1"/>
+                        </a:solidFill>
+                        <a:latin typeface="+mj-lt"/>
+                        <a:cs typeface="Consolas" pitchFamily="49" charset="0"/>
+                      </a:endParaRPr>
+                    </a:p>
+                  </a:txBody>
+                  <a:tcPr/>
+                </a:tc>
+                <a:tc>
+                  <a:txBody>
+                    <a:bodyPr/>
+                    <a:lstStyle/>
+                    <a:p>
+                      <a:pPr lvl="4"/>
+                      <a:r>
+                        <a:rPr lang="en-US" sz="1100" b="0" dirty="0" smtClean="0">
+                          <a:latin typeface="Consolas" pitchFamily="49" charset="0"/>
+                          <a:cs typeface="Consolas" pitchFamily="49" charset="0"/>
+                        </a:rPr>
+                        <a:t>Left : </a:t>
+                      </a:r>
+                      <a:r>
+                        <a:rPr lang="en-US" sz="1100" b="0" dirty="0" err="1" smtClean="0">
+                          <a:solidFill>
+                            <a:schemeClr val="bg1">
+                              <a:lumMod val="65000"/>
+                            </a:schemeClr>
+                          </a:solidFill>
+                          <a:latin typeface="Consolas" pitchFamily="49" charset="0"/>
+                          <a:cs typeface="Consolas" pitchFamily="49" charset="0"/>
+                        </a:rPr>
+                        <a:t>IHappilOperand</a:t>
+                      </a:r>
+                      <a:r>
+                        <a:rPr lang="en-US" sz="1100" b="0" dirty="0" smtClean="0">
+                          <a:solidFill>
+                            <a:schemeClr val="bg1">
+                              <a:lumMod val="65000"/>
+                            </a:schemeClr>
+                          </a:solidFill>
+                          <a:latin typeface="Consolas" pitchFamily="49" charset="0"/>
+                          <a:cs typeface="Consolas" pitchFamily="49" charset="0"/>
+                        </a:rPr>
+                        <a:t>&lt;</a:t>
+                      </a:r>
+                      <a:r>
+                        <a:rPr lang="en-US" sz="1100" b="0" dirty="0" err="1" smtClean="0">
+                          <a:solidFill>
+                            <a:schemeClr val="bg1">
+                              <a:lumMod val="65000"/>
+                            </a:schemeClr>
+                          </a:solidFill>
+                          <a:latin typeface="Consolas" pitchFamily="49" charset="0"/>
+                          <a:cs typeface="Consolas" pitchFamily="49" charset="0"/>
+                        </a:rPr>
+                        <a:t>int</a:t>
+                      </a:r>
+                      <a:r>
+                        <a:rPr lang="en-US" sz="1100" b="0" dirty="0" smtClean="0">
+                          <a:solidFill>
+                            <a:schemeClr val="bg1">
+                              <a:lumMod val="65000"/>
+                            </a:schemeClr>
+                          </a:solidFill>
+                          <a:latin typeface="Consolas" pitchFamily="49" charset="0"/>
+                          <a:cs typeface="Consolas" pitchFamily="49" charset="0"/>
+                        </a:rPr>
+                        <a:t>&gt;</a:t>
+                      </a:r>
+                      <a:r>
+                        <a:rPr lang="en-US" sz="1100" b="0" baseline="0" dirty="0" smtClean="0">
+                          <a:solidFill>
+                            <a:schemeClr val="bg1">
+                              <a:lumMod val="65000"/>
+                            </a:schemeClr>
+                          </a:solidFill>
+                          <a:latin typeface="Consolas" pitchFamily="49" charset="0"/>
+                          <a:cs typeface="Consolas" pitchFamily="49" charset="0"/>
+                        </a:rPr>
+                        <a:t> </a:t>
+                      </a:r>
+                      <a:r>
+                        <a:rPr lang="en-US" sz="1100" b="0" baseline="0" dirty="0" smtClean="0">
+                          <a:solidFill>
+                            <a:schemeClr val="tx1">
+                              <a:lumMod val="50000"/>
+                              <a:lumOff val="50000"/>
+                            </a:schemeClr>
+                          </a:solidFill>
+                          <a:latin typeface="Consolas" pitchFamily="49" charset="0"/>
+                          <a:cs typeface="Consolas" pitchFamily="49" charset="0"/>
+                        </a:rPr>
+                        <a:t>{</a:t>
+                      </a:r>
+                      <a:r>
+                        <a:rPr lang="en-US" sz="1100" b="0" baseline="0" dirty="0" smtClean="0">
+                          <a:solidFill>
+                            <a:srgbClr val="C00000"/>
+                          </a:solidFill>
+                          <a:latin typeface="Consolas" pitchFamily="49" charset="0"/>
+                          <a:cs typeface="Consolas" pitchFamily="49" charset="0"/>
+                        </a:rPr>
+                        <a:t> </a:t>
+                      </a:r>
+                      <a:r>
+                        <a:rPr lang="en-US" sz="1100" b="0" dirty="0" err="1" smtClean="0">
+                          <a:solidFill>
+                            <a:srgbClr val="C00000"/>
+                          </a:solidFill>
+                          <a:latin typeface="Consolas" pitchFamily="49" charset="0"/>
+                          <a:cs typeface="Consolas" pitchFamily="49" charset="0"/>
+                        </a:rPr>
+                        <a:t>HappilArgument</a:t>
+                      </a:r>
+                      <a:r>
+                        <a:rPr lang="en-US" sz="1100" b="0" dirty="0" smtClean="0">
+                          <a:solidFill>
+                            <a:srgbClr val="C00000"/>
+                          </a:solidFill>
+                          <a:latin typeface="Consolas" pitchFamily="49" charset="0"/>
+                          <a:cs typeface="Consolas" pitchFamily="49" charset="0"/>
+                        </a:rPr>
+                        <a:t>&lt;</a:t>
+                      </a:r>
+                      <a:r>
+                        <a:rPr lang="en-US" sz="1100" b="0" dirty="0" err="1" smtClean="0">
+                          <a:solidFill>
+                            <a:srgbClr val="C00000"/>
+                          </a:solidFill>
+                          <a:latin typeface="Consolas" pitchFamily="49" charset="0"/>
+                          <a:cs typeface="Consolas" pitchFamily="49" charset="0"/>
+                        </a:rPr>
+                        <a:t>int</a:t>
+                      </a:r>
+                      <a:r>
+                        <a:rPr lang="en-US" sz="1100" b="0" dirty="0" smtClean="0">
+                          <a:solidFill>
+                            <a:srgbClr val="C00000"/>
+                          </a:solidFill>
+                          <a:latin typeface="Consolas" pitchFamily="49" charset="0"/>
+                          <a:cs typeface="Consolas" pitchFamily="49" charset="0"/>
+                        </a:rPr>
+                        <a:t>&gt;</a:t>
+                      </a:r>
+                      <a:r>
+                        <a:rPr lang="en-US" sz="1100" b="0" baseline="0" dirty="0" smtClean="0">
+                          <a:solidFill>
+                            <a:srgbClr val="C00000"/>
+                          </a:solidFill>
+                          <a:latin typeface="Consolas" pitchFamily="49" charset="0"/>
+                          <a:cs typeface="Consolas" pitchFamily="49" charset="0"/>
+                        </a:rPr>
+                        <a:t> “x” </a:t>
+                      </a:r>
+                      <a:r>
+                        <a:rPr lang="en-US" sz="1100" b="0" baseline="0" dirty="0" smtClean="0">
+                          <a:solidFill>
+                            <a:schemeClr val="tx1">
+                              <a:lumMod val="50000"/>
+                              <a:lumOff val="50000"/>
+                            </a:schemeClr>
+                          </a:solidFill>
+                          <a:latin typeface="Consolas" pitchFamily="49" charset="0"/>
+                          <a:cs typeface="Consolas" pitchFamily="49" charset="0"/>
+                        </a:rPr>
+                        <a:t>}</a:t>
+                      </a:r>
+                      <a:endParaRPr lang="en-US" sz="1100" b="0" dirty="0">
+                        <a:solidFill>
+                          <a:schemeClr val="tx1">
+                            <a:lumMod val="50000"/>
+                            <a:lumOff val="50000"/>
+                          </a:schemeClr>
+                        </a:solidFill>
+                        <a:latin typeface="Consolas" pitchFamily="49" charset="0"/>
+                        <a:cs typeface="Consolas" pitchFamily="49" charset="0"/>
+                      </a:endParaRPr>
+                    </a:p>
+                  </a:txBody>
+                  <a:tcPr/>
+                </a:tc>
+                <a:tc>
+                  <a:txBody>
+                    <a:bodyPr/>
+                    <a:lstStyle/>
+                    <a:p>
+                      <a:r>
+                        <a:rPr lang="en-US" sz="1100" b="0" dirty="0" err="1" smtClean="0">
+                          <a:latin typeface="Consolas" pitchFamily="49" charset="0"/>
+                          <a:cs typeface="Consolas" pitchFamily="49" charset="0"/>
+                        </a:rPr>
+                        <a:t>EmitTarget</a:t>
+                      </a:r>
+                      <a:endParaRPr lang="en-US" sz="1100" b="0" dirty="0">
+                        <a:latin typeface="Consolas" pitchFamily="49" charset="0"/>
+                        <a:cs typeface="Consolas" pitchFamily="49" charset="0"/>
+                      </a:endParaRPr>
+                    </a:p>
+                  </a:txBody>
+                  <a:tcPr/>
+                </a:tc>
+                <a:tc>
+                  <a:txBody>
+                    <a:bodyPr/>
+                    <a:lstStyle/>
+                    <a:p>
+                      <a:r>
+                        <a:rPr lang="en-US" sz="1100" b="1" dirty="0" smtClean="0">
+                          <a:latin typeface="Consolas" pitchFamily="49" charset="0"/>
+                          <a:cs typeface="Consolas" pitchFamily="49" charset="0"/>
+                        </a:rPr>
+                        <a:t>-</a:t>
+                      </a:r>
+                      <a:endParaRPr lang="en-US" sz="1100" b="1" dirty="0">
+                        <a:latin typeface="Consolas" pitchFamily="49" charset="0"/>
+                        <a:cs typeface="Consolas" pitchFamily="49" charset="0"/>
+                      </a:endParaRPr>
+                    </a:p>
+                  </a:txBody>
+                  <a:tcPr/>
+                </a:tc>
+              </a:tr>
+              <a:tr h="274320">
+                <a:tc>
+                  <a:txBody>
+                    <a:bodyPr/>
+                    <a:lstStyle/>
+                    <a:p>
+                      <a:pPr lvl="0"/>
+                      <a:r>
+                        <a:rPr lang="en-US" sz="1100" b="0" dirty="0" smtClean="0">
+                          <a:solidFill>
+                            <a:schemeClr val="tx1"/>
+                          </a:solidFill>
+                          <a:latin typeface="+mj-lt"/>
+                          <a:cs typeface="Consolas" pitchFamily="49" charset="0"/>
+                        </a:rPr>
+                        <a:t>7</a:t>
+                      </a:r>
+                      <a:endParaRPr lang="en-US" sz="1100" b="0" dirty="0">
+                        <a:solidFill>
+                          <a:schemeClr val="tx1"/>
+                        </a:solidFill>
+                        <a:latin typeface="+mj-lt"/>
+                        <a:cs typeface="Consolas" pitchFamily="49" charset="0"/>
+                      </a:endParaRPr>
+                    </a:p>
+                  </a:txBody>
+                  <a:tcPr/>
+                </a:tc>
+                <a:tc>
+                  <a:txBody>
+                    <a:bodyPr/>
+                    <a:lstStyle/>
+                    <a:p>
+                      <a:pPr lvl="4"/>
+                      <a:r>
+                        <a:rPr lang="en-US" sz="1100" b="0" dirty="0" smtClean="0">
+                          <a:latin typeface="Consolas" pitchFamily="49" charset="0"/>
+                          <a:cs typeface="Consolas" pitchFamily="49" charset="0"/>
+                        </a:rPr>
+                        <a:t>Left : </a:t>
+                      </a:r>
+                      <a:r>
+                        <a:rPr lang="en-US" sz="1100" b="0" dirty="0" err="1" smtClean="0">
+                          <a:solidFill>
+                            <a:schemeClr val="bg1">
+                              <a:lumMod val="65000"/>
+                            </a:schemeClr>
+                          </a:solidFill>
+                          <a:latin typeface="Consolas" pitchFamily="49" charset="0"/>
+                          <a:cs typeface="Consolas" pitchFamily="49" charset="0"/>
+                        </a:rPr>
+                        <a:t>IHappilOperand</a:t>
+                      </a:r>
+                      <a:r>
+                        <a:rPr lang="en-US" sz="1100" b="0" dirty="0" smtClean="0">
+                          <a:solidFill>
+                            <a:schemeClr val="bg1">
+                              <a:lumMod val="65000"/>
+                            </a:schemeClr>
+                          </a:solidFill>
+                          <a:latin typeface="Consolas" pitchFamily="49" charset="0"/>
+                          <a:cs typeface="Consolas" pitchFamily="49" charset="0"/>
+                        </a:rPr>
+                        <a:t>&lt;</a:t>
+                      </a:r>
+                      <a:r>
+                        <a:rPr lang="en-US" sz="1100" b="0" dirty="0" err="1" smtClean="0">
+                          <a:solidFill>
+                            <a:schemeClr val="bg1">
+                              <a:lumMod val="65000"/>
+                            </a:schemeClr>
+                          </a:solidFill>
+                          <a:latin typeface="Consolas" pitchFamily="49" charset="0"/>
+                          <a:cs typeface="Consolas" pitchFamily="49" charset="0"/>
+                        </a:rPr>
+                        <a:t>int</a:t>
+                      </a:r>
+                      <a:r>
+                        <a:rPr lang="en-US" sz="1100" b="0" dirty="0" smtClean="0">
+                          <a:solidFill>
+                            <a:schemeClr val="bg1">
+                              <a:lumMod val="65000"/>
+                            </a:schemeClr>
+                          </a:solidFill>
+                          <a:latin typeface="Consolas" pitchFamily="49" charset="0"/>
+                          <a:cs typeface="Consolas" pitchFamily="49" charset="0"/>
+                        </a:rPr>
+                        <a:t>&gt; </a:t>
+                      </a:r>
+                      <a:r>
+                        <a:rPr lang="en-US" sz="1100" b="0" dirty="0" smtClean="0">
+                          <a:solidFill>
+                            <a:schemeClr val="tx1">
+                              <a:lumMod val="50000"/>
+                              <a:lumOff val="50000"/>
+                            </a:schemeClr>
+                          </a:solidFill>
+                          <a:latin typeface="Consolas" pitchFamily="49" charset="0"/>
+                          <a:cs typeface="Consolas" pitchFamily="49" charset="0"/>
+                        </a:rPr>
+                        <a:t>{</a:t>
+                      </a:r>
+                      <a:r>
+                        <a:rPr lang="en-US" sz="1100" b="0" dirty="0" smtClean="0">
+                          <a:solidFill>
+                            <a:srgbClr val="C00000"/>
+                          </a:solidFill>
+                          <a:latin typeface="Consolas" pitchFamily="49" charset="0"/>
+                          <a:cs typeface="Consolas" pitchFamily="49" charset="0"/>
+                        </a:rPr>
+                        <a:t> </a:t>
+                      </a:r>
+                      <a:r>
+                        <a:rPr lang="en-US" sz="1100" b="0" dirty="0" err="1" smtClean="0">
+                          <a:solidFill>
+                            <a:srgbClr val="C00000"/>
+                          </a:solidFill>
+                          <a:latin typeface="Consolas" pitchFamily="49" charset="0"/>
+                          <a:cs typeface="Consolas" pitchFamily="49" charset="0"/>
+                        </a:rPr>
+                        <a:t>HappilArgument</a:t>
+                      </a:r>
+                      <a:r>
+                        <a:rPr lang="en-US" sz="1100" b="0" dirty="0" smtClean="0">
+                          <a:solidFill>
+                            <a:srgbClr val="C00000"/>
+                          </a:solidFill>
+                          <a:latin typeface="Consolas" pitchFamily="49" charset="0"/>
+                          <a:cs typeface="Consolas" pitchFamily="49" charset="0"/>
+                        </a:rPr>
+                        <a:t>&lt;</a:t>
+                      </a:r>
+                      <a:r>
+                        <a:rPr lang="en-US" sz="1100" b="0" dirty="0" err="1" smtClean="0">
+                          <a:solidFill>
+                            <a:srgbClr val="C00000"/>
+                          </a:solidFill>
+                          <a:latin typeface="Consolas" pitchFamily="49" charset="0"/>
+                          <a:cs typeface="Consolas" pitchFamily="49" charset="0"/>
+                        </a:rPr>
+                        <a:t>int</a:t>
+                      </a:r>
+                      <a:r>
+                        <a:rPr lang="en-US" sz="1100" b="0" dirty="0" smtClean="0">
+                          <a:solidFill>
+                            <a:srgbClr val="C00000"/>
+                          </a:solidFill>
+                          <a:latin typeface="Consolas" pitchFamily="49" charset="0"/>
+                          <a:cs typeface="Consolas" pitchFamily="49" charset="0"/>
+                        </a:rPr>
+                        <a:t>&gt;</a:t>
+                      </a:r>
+                      <a:r>
+                        <a:rPr lang="en-US" sz="1100" b="0" baseline="0" dirty="0" smtClean="0">
+                          <a:solidFill>
+                            <a:srgbClr val="C00000"/>
+                          </a:solidFill>
+                          <a:latin typeface="Consolas" pitchFamily="49" charset="0"/>
+                          <a:cs typeface="Consolas" pitchFamily="49" charset="0"/>
+                        </a:rPr>
+                        <a:t> “x” </a:t>
+                      </a:r>
+                      <a:r>
+                        <a:rPr lang="en-US" sz="1100" b="0" baseline="0" dirty="0" smtClean="0">
+                          <a:solidFill>
+                            <a:schemeClr val="tx1">
+                              <a:lumMod val="50000"/>
+                              <a:lumOff val="50000"/>
+                            </a:schemeClr>
+                          </a:solidFill>
+                          <a:latin typeface="Consolas" pitchFamily="49" charset="0"/>
+                          <a:cs typeface="Consolas" pitchFamily="49" charset="0"/>
+                        </a:rPr>
+                        <a:t>}</a:t>
+                      </a:r>
+                      <a:endParaRPr lang="en-US" sz="1100" b="0" dirty="0">
+                        <a:solidFill>
+                          <a:schemeClr val="tx1">
+                            <a:lumMod val="50000"/>
+                            <a:lumOff val="50000"/>
+                          </a:schemeClr>
+                        </a:solidFill>
+                        <a:latin typeface="Consolas" pitchFamily="49" charset="0"/>
+                        <a:cs typeface="Consolas" pitchFamily="49" charset="0"/>
+                      </a:endParaRPr>
+                    </a:p>
+                  </a:txBody>
+                  <a:tcPr/>
+                </a:tc>
+                <a:tc>
+                  <a:txBody>
+                    <a:bodyPr/>
+                    <a:lstStyle/>
+                    <a:p>
+                      <a:r>
+                        <a:rPr lang="en-US" sz="1100" b="0" dirty="0" err="1" smtClean="0">
+                          <a:latin typeface="Consolas" pitchFamily="49" charset="0"/>
+                          <a:cs typeface="Consolas" pitchFamily="49" charset="0"/>
+                        </a:rPr>
+                        <a:t>EmitLoad</a:t>
+                      </a:r>
+                      <a:endParaRPr lang="en-US" sz="1100" b="0" dirty="0">
+                        <a:latin typeface="Consolas" pitchFamily="49" charset="0"/>
+                        <a:cs typeface="Consolas" pitchFamily="49" charset="0"/>
+                      </a:endParaRPr>
+                    </a:p>
+                  </a:txBody>
+                  <a:tcPr/>
+                </a:tc>
+                <a:tc>
+                  <a:txBody>
+                    <a:bodyPr/>
+                    <a:lstStyle/>
+                    <a:p>
+                      <a:r>
+                        <a:rPr lang="en-US" sz="1100" b="1" dirty="0" smtClean="0">
+                          <a:latin typeface="Consolas" pitchFamily="49" charset="0"/>
+                          <a:cs typeface="Consolas" pitchFamily="49" charset="0"/>
+                        </a:rPr>
+                        <a:t>ldarg.1</a:t>
+                      </a:r>
+                      <a:endParaRPr lang="en-US" sz="1100" b="1" dirty="0">
+                        <a:latin typeface="Consolas" pitchFamily="49" charset="0"/>
+                        <a:cs typeface="Consolas" pitchFamily="49" charset="0"/>
+                      </a:endParaRPr>
+                    </a:p>
+                  </a:txBody>
+                  <a:tcPr/>
+                </a:tc>
+              </a:tr>
+              <a:tr h="274320">
+                <a:tc>
+                  <a:txBody>
+                    <a:bodyPr/>
+                    <a:lstStyle/>
+                    <a:p>
+                      <a:pPr lvl="0"/>
+                      <a:r>
+                        <a:rPr lang="en-US" sz="1100" b="0" dirty="0" smtClean="0">
+                          <a:solidFill>
+                            <a:schemeClr val="tx1"/>
+                          </a:solidFill>
+                          <a:latin typeface="+mj-lt"/>
+                          <a:cs typeface="Consolas" pitchFamily="49" charset="0"/>
+                        </a:rPr>
+                        <a:t>8</a:t>
+                      </a:r>
+                      <a:endParaRPr lang="en-US" sz="1100" b="0" dirty="0">
+                        <a:solidFill>
+                          <a:schemeClr val="tx1"/>
+                        </a:solidFill>
+                        <a:latin typeface="+mj-lt"/>
+                        <a:cs typeface="Consolas" pitchFamily="49" charset="0"/>
+                      </a:endParaRPr>
+                    </a:p>
+                  </a:txBody>
+                  <a:tcPr/>
+                </a:tc>
+                <a:tc>
+                  <a:txBody>
+                    <a:bodyPr/>
+                    <a:lstStyle/>
+                    <a:p>
+                      <a:pPr lvl="4"/>
+                      <a:r>
+                        <a:rPr lang="en-US" sz="1100" b="0" dirty="0" smtClean="0">
+                          <a:latin typeface="Consolas" pitchFamily="49" charset="0"/>
+                          <a:cs typeface="Consolas" pitchFamily="49" charset="0"/>
+                        </a:rPr>
+                        <a:t>Right : </a:t>
+                      </a:r>
+                      <a:r>
+                        <a:rPr lang="en-US" sz="1100" b="0" dirty="0" err="1" smtClean="0">
+                          <a:solidFill>
+                            <a:schemeClr val="bg1">
+                              <a:lumMod val="65000"/>
+                            </a:schemeClr>
+                          </a:solidFill>
+                          <a:latin typeface="Consolas" pitchFamily="49" charset="0"/>
+                          <a:cs typeface="Consolas" pitchFamily="49" charset="0"/>
+                        </a:rPr>
+                        <a:t>IHappilOperand</a:t>
+                      </a:r>
+                      <a:r>
+                        <a:rPr lang="en-US" sz="1100" b="0" dirty="0" smtClean="0">
+                          <a:solidFill>
+                            <a:schemeClr val="bg1">
+                              <a:lumMod val="65000"/>
+                            </a:schemeClr>
+                          </a:solidFill>
+                          <a:latin typeface="Consolas" pitchFamily="49" charset="0"/>
+                          <a:cs typeface="Consolas" pitchFamily="49" charset="0"/>
+                        </a:rPr>
+                        <a:t>&lt;</a:t>
+                      </a:r>
+                      <a:r>
+                        <a:rPr lang="en-US" sz="1100" b="0" dirty="0" err="1" smtClean="0">
+                          <a:solidFill>
+                            <a:schemeClr val="bg1">
+                              <a:lumMod val="65000"/>
+                            </a:schemeClr>
+                          </a:solidFill>
+                          <a:latin typeface="Consolas" pitchFamily="49" charset="0"/>
+                          <a:cs typeface="Consolas" pitchFamily="49" charset="0"/>
+                        </a:rPr>
+                        <a:t>int</a:t>
+                      </a:r>
+                      <a:r>
+                        <a:rPr lang="en-US" sz="1100" b="0" dirty="0" smtClean="0">
+                          <a:solidFill>
+                            <a:schemeClr val="bg1">
+                              <a:lumMod val="65000"/>
+                            </a:schemeClr>
+                          </a:solidFill>
+                          <a:latin typeface="Consolas" pitchFamily="49" charset="0"/>
+                          <a:cs typeface="Consolas" pitchFamily="49" charset="0"/>
+                        </a:rPr>
+                        <a:t>&gt; </a:t>
+                      </a:r>
+                      <a:r>
+                        <a:rPr lang="en-US" sz="1100" b="0" dirty="0" smtClean="0">
+                          <a:solidFill>
+                            <a:schemeClr val="tx1">
+                              <a:lumMod val="50000"/>
+                              <a:lumOff val="50000"/>
+                            </a:schemeClr>
+                          </a:solidFill>
+                          <a:latin typeface="Consolas" pitchFamily="49" charset="0"/>
+                          <a:cs typeface="Consolas" pitchFamily="49" charset="0"/>
+                        </a:rPr>
+                        <a:t>{</a:t>
+                      </a:r>
+                      <a:r>
+                        <a:rPr lang="en-US" sz="1100" b="0" baseline="0" dirty="0" smtClean="0">
+                          <a:solidFill>
+                            <a:srgbClr val="C00000"/>
+                          </a:solidFill>
+                          <a:latin typeface="Consolas" pitchFamily="49" charset="0"/>
+                          <a:cs typeface="Consolas" pitchFamily="49" charset="0"/>
+                        </a:rPr>
+                        <a:t> </a:t>
+                      </a:r>
+                      <a:r>
+                        <a:rPr lang="en-US" sz="1100" b="0" dirty="0" err="1" smtClean="0">
+                          <a:solidFill>
+                            <a:srgbClr val="C00000"/>
+                          </a:solidFill>
+                          <a:latin typeface="Consolas" pitchFamily="49" charset="0"/>
+                          <a:cs typeface="Consolas" pitchFamily="49" charset="0"/>
+                        </a:rPr>
+                        <a:t>HappilArgument</a:t>
+                      </a:r>
+                      <a:r>
+                        <a:rPr lang="en-US" sz="1100" b="0" dirty="0" smtClean="0">
+                          <a:solidFill>
+                            <a:srgbClr val="C00000"/>
+                          </a:solidFill>
+                          <a:latin typeface="Consolas" pitchFamily="49" charset="0"/>
+                          <a:cs typeface="Consolas" pitchFamily="49" charset="0"/>
+                        </a:rPr>
+                        <a:t>&lt;</a:t>
+                      </a:r>
+                      <a:r>
+                        <a:rPr lang="en-US" sz="1100" b="0" dirty="0" err="1" smtClean="0">
+                          <a:solidFill>
+                            <a:srgbClr val="C00000"/>
+                          </a:solidFill>
+                          <a:latin typeface="Consolas" pitchFamily="49" charset="0"/>
+                          <a:cs typeface="Consolas" pitchFamily="49" charset="0"/>
+                        </a:rPr>
+                        <a:t>int</a:t>
+                      </a:r>
+                      <a:r>
+                        <a:rPr lang="en-US" sz="1100" b="0" dirty="0" smtClean="0">
+                          <a:solidFill>
+                            <a:srgbClr val="C00000"/>
+                          </a:solidFill>
+                          <a:latin typeface="Consolas" pitchFamily="49" charset="0"/>
+                          <a:cs typeface="Consolas" pitchFamily="49" charset="0"/>
+                        </a:rPr>
+                        <a:t>&gt;</a:t>
+                      </a:r>
+                      <a:r>
+                        <a:rPr lang="en-US" sz="1100" b="0" baseline="0" dirty="0" smtClean="0">
+                          <a:solidFill>
+                            <a:srgbClr val="C00000"/>
+                          </a:solidFill>
+                          <a:latin typeface="Consolas" pitchFamily="49" charset="0"/>
+                          <a:cs typeface="Consolas" pitchFamily="49" charset="0"/>
+                        </a:rPr>
+                        <a:t> </a:t>
+                      </a:r>
+                      <a:r>
+                        <a:rPr lang="en-US" sz="1100" b="0" baseline="0" dirty="0" smtClean="0">
+                          <a:solidFill>
+                            <a:srgbClr val="C00000"/>
+                          </a:solidFill>
+                          <a:latin typeface="Consolas" pitchFamily="49" charset="0"/>
+                          <a:cs typeface="Consolas" pitchFamily="49" charset="0"/>
+                        </a:rPr>
+                        <a:t>“y” </a:t>
+                      </a:r>
+                      <a:r>
+                        <a:rPr lang="en-US" sz="1100" b="0" baseline="0" dirty="0" smtClean="0">
+                          <a:solidFill>
+                            <a:schemeClr val="tx1">
+                              <a:lumMod val="50000"/>
+                              <a:lumOff val="50000"/>
+                            </a:schemeClr>
+                          </a:solidFill>
+                          <a:latin typeface="Consolas" pitchFamily="49" charset="0"/>
+                          <a:cs typeface="Consolas" pitchFamily="49" charset="0"/>
+                        </a:rPr>
+                        <a:t>}</a:t>
+                      </a:r>
+                      <a:endParaRPr lang="en-US" sz="1100" b="0" dirty="0">
+                        <a:solidFill>
+                          <a:schemeClr val="tx1">
+                            <a:lumMod val="50000"/>
+                            <a:lumOff val="50000"/>
+                          </a:schemeClr>
+                        </a:solidFill>
+                        <a:latin typeface="Consolas" pitchFamily="49" charset="0"/>
+                        <a:cs typeface="Consolas" pitchFamily="49" charset="0"/>
+                      </a:endParaRPr>
+                    </a:p>
+                  </a:txBody>
+                  <a:tcPr/>
+                </a:tc>
+                <a:tc>
+                  <a:txBody>
+                    <a:bodyPr/>
+                    <a:lstStyle/>
+                    <a:p>
+                      <a:r>
+                        <a:rPr lang="en-US" sz="1100" b="0" dirty="0" err="1" smtClean="0">
+                          <a:latin typeface="Consolas" pitchFamily="49" charset="0"/>
+                          <a:cs typeface="Consolas" pitchFamily="49" charset="0"/>
+                        </a:rPr>
+                        <a:t>EmitTarget</a:t>
+                      </a:r>
+                      <a:endParaRPr lang="en-US" sz="1100" b="0" dirty="0">
+                        <a:latin typeface="Consolas" pitchFamily="49" charset="0"/>
+                        <a:cs typeface="Consolas" pitchFamily="49" charset="0"/>
+                      </a:endParaRPr>
+                    </a:p>
+                  </a:txBody>
+                  <a:tcPr/>
+                </a:tc>
+                <a:tc>
+                  <a:txBody>
+                    <a:bodyPr/>
+                    <a:lstStyle/>
+                    <a:p>
+                      <a:r>
+                        <a:rPr lang="en-US" sz="1100" b="1" dirty="0" smtClean="0">
+                          <a:latin typeface="Consolas" pitchFamily="49" charset="0"/>
+                          <a:cs typeface="Consolas" pitchFamily="49" charset="0"/>
+                        </a:rPr>
+                        <a:t>-</a:t>
+                      </a:r>
+                      <a:endParaRPr lang="en-US" sz="1100" b="1" dirty="0">
+                        <a:latin typeface="Consolas" pitchFamily="49" charset="0"/>
+                        <a:cs typeface="Consolas" pitchFamily="49" charset="0"/>
+                      </a:endParaRPr>
+                    </a:p>
+                  </a:txBody>
+                  <a:tcPr/>
+                </a:tc>
+              </a:tr>
+              <a:tr h="274320">
+                <a:tc>
+                  <a:txBody>
+                    <a:bodyPr/>
+                    <a:lstStyle/>
+                    <a:p>
+                      <a:pPr lvl="0"/>
+                      <a:r>
+                        <a:rPr lang="en-US" sz="1100" b="0" dirty="0" smtClean="0">
+                          <a:solidFill>
+                            <a:schemeClr val="tx1"/>
+                          </a:solidFill>
+                          <a:latin typeface="+mj-lt"/>
+                          <a:cs typeface="Consolas" pitchFamily="49" charset="0"/>
+                        </a:rPr>
+                        <a:t>9</a:t>
+                      </a:r>
+                      <a:endParaRPr lang="en-US" sz="1100" b="0" dirty="0">
+                        <a:solidFill>
+                          <a:schemeClr val="tx1"/>
+                        </a:solidFill>
+                        <a:latin typeface="+mj-lt"/>
+                        <a:cs typeface="Consolas" pitchFamily="49" charset="0"/>
+                      </a:endParaRPr>
+                    </a:p>
+                  </a:txBody>
+                  <a:tcPr/>
+                </a:tc>
+                <a:tc>
+                  <a:txBody>
+                    <a:bodyPr/>
+                    <a:lstStyle/>
+                    <a:p>
+                      <a:pPr lvl="4"/>
+                      <a:r>
+                        <a:rPr lang="en-US" sz="1100" b="0" dirty="0" smtClean="0">
+                          <a:latin typeface="Consolas" pitchFamily="49" charset="0"/>
+                          <a:cs typeface="Consolas" pitchFamily="49" charset="0"/>
+                        </a:rPr>
+                        <a:t>Right : </a:t>
+                      </a:r>
+                      <a:r>
+                        <a:rPr lang="en-US" sz="1100" b="0" dirty="0" err="1" smtClean="0">
+                          <a:solidFill>
+                            <a:schemeClr val="bg1">
+                              <a:lumMod val="65000"/>
+                            </a:schemeClr>
+                          </a:solidFill>
+                          <a:latin typeface="Consolas" pitchFamily="49" charset="0"/>
+                          <a:cs typeface="Consolas" pitchFamily="49" charset="0"/>
+                        </a:rPr>
+                        <a:t>IHappilOperand</a:t>
+                      </a:r>
+                      <a:r>
+                        <a:rPr lang="en-US" sz="1100" b="0" dirty="0" smtClean="0">
+                          <a:solidFill>
+                            <a:schemeClr val="bg1">
+                              <a:lumMod val="65000"/>
+                            </a:schemeClr>
+                          </a:solidFill>
+                          <a:latin typeface="Consolas" pitchFamily="49" charset="0"/>
+                          <a:cs typeface="Consolas" pitchFamily="49" charset="0"/>
+                        </a:rPr>
+                        <a:t>&lt;</a:t>
+                      </a:r>
+                      <a:r>
+                        <a:rPr lang="en-US" sz="1100" b="0" dirty="0" err="1" smtClean="0">
+                          <a:solidFill>
+                            <a:schemeClr val="bg1">
+                              <a:lumMod val="65000"/>
+                            </a:schemeClr>
+                          </a:solidFill>
+                          <a:latin typeface="Consolas" pitchFamily="49" charset="0"/>
+                          <a:cs typeface="Consolas" pitchFamily="49" charset="0"/>
+                        </a:rPr>
+                        <a:t>int</a:t>
+                      </a:r>
+                      <a:r>
+                        <a:rPr lang="en-US" sz="1100" b="0" dirty="0" smtClean="0">
+                          <a:solidFill>
+                            <a:schemeClr val="bg1">
+                              <a:lumMod val="65000"/>
+                            </a:schemeClr>
+                          </a:solidFill>
+                          <a:latin typeface="Consolas" pitchFamily="49" charset="0"/>
+                          <a:cs typeface="Consolas" pitchFamily="49" charset="0"/>
+                        </a:rPr>
+                        <a:t>&gt; </a:t>
+                      </a:r>
+                      <a:r>
+                        <a:rPr lang="en-US" sz="1100" b="0" dirty="0" smtClean="0">
+                          <a:solidFill>
+                            <a:schemeClr val="tx1">
+                              <a:lumMod val="50000"/>
+                              <a:lumOff val="50000"/>
+                            </a:schemeClr>
+                          </a:solidFill>
+                          <a:latin typeface="Consolas" pitchFamily="49" charset="0"/>
+                          <a:cs typeface="Consolas" pitchFamily="49" charset="0"/>
+                        </a:rPr>
+                        <a:t>{</a:t>
+                      </a:r>
+                      <a:r>
+                        <a:rPr lang="en-US" sz="1100" b="0" dirty="0" smtClean="0">
+                          <a:solidFill>
+                            <a:srgbClr val="C00000"/>
+                          </a:solidFill>
+                          <a:latin typeface="Consolas" pitchFamily="49" charset="0"/>
+                          <a:cs typeface="Consolas" pitchFamily="49" charset="0"/>
+                        </a:rPr>
+                        <a:t> </a:t>
+                      </a:r>
+                      <a:r>
+                        <a:rPr lang="en-US" sz="1100" b="0" dirty="0" err="1" smtClean="0">
+                          <a:solidFill>
+                            <a:srgbClr val="C00000"/>
+                          </a:solidFill>
+                          <a:latin typeface="Consolas" pitchFamily="49" charset="0"/>
+                          <a:cs typeface="Consolas" pitchFamily="49" charset="0"/>
+                        </a:rPr>
+                        <a:t>HappilArgument</a:t>
+                      </a:r>
+                      <a:r>
+                        <a:rPr lang="en-US" sz="1100" b="0" dirty="0" smtClean="0">
+                          <a:solidFill>
+                            <a:srgbClr val="C00000"/>
+                          </a:solidFill>
+                          <a:latin typeface="Consolas" pitchFamily="49" charset="0"/>
+                          <a:cs typeface="Consolas" pitchFamily="49" charset="0"/>
+                        </a:rPr>
+                        <a:t>&lt;</a:t>
+                      </a:r>
+                      <a:r>
+                        <a:rPr lang="en-US" sz="1100" b="0" dirty="0" err="1" smtClean="0">
+                          <a:solidFill>
+                            <a:srgbClr val="C00000"/>
+                          </a:solidFill>
+                          <a:latin typeface="Consolas" pitchFamily="49" charset="0"/>
+                          <a:cs typeface="Consolas" pitchFamily="49" charset="0"/>
+                        </a:rPr>
+                        <a:t>int</a:t>
+                      </a:r>
+                      <a:r>
+                        <a:rPr lang="en-US" sz="1100" b="0" dirty="0" smtClean="0">
+                          <a:solidFill>
+                            <a:srgbClr val="C00000"/>
+                          </a:solidFill>
+                          <a:latin typeface="Consolas" pitchFamily="49" charset="0"/>
+                          <a:cs typeface="Consolas" pitchFamily="49" charset="0"/>
+                        </a:rPr>
+                        <a:t>&gt;</a:t>
+                      </a:r>
+                      <a:r>
+                        <a:rPr lang="en-US" sz="1100" b="0" baseline="0" dirty="0" smtClean="0">
+                          <a:solidFill>
+                            <a:srgbClr val="C00000"/>
+                          </a:solidFill>
+                          <a:latin typeface="Consolas" pitchFamily="49" charset="0"/>
+                          <a:cs typeface="Consolas" pitchFamily="49" charset="0"/>
+                        </a:rPr>
+                        <a:t> “y” </a:t>
+                      </a:r>
+                      <a:r>
+                        <a:rPr lang="en-US" sz="1100" b="0" baseline="0" dirty="0" smtClean="0">
+                          <a:solidFill>
+                            <a:schemeClr val="tx1">
+                              <a:lumMod val="50000"/>
+                              <a:lumOff val="50000"/>
+                            </a:schemeClr>
+                          </a:solidFill>
+                          <a:latin typeface="Consolas" pitchFamily="49" charset="0"/>
+                          <a:cs typeface="Consolas" pitchFamily="49" charset="0"/>
+                        </a:rPr>
+                        <a:t>}</a:t>
+                      </a:r>
+                      <a:endParaRPr lang="en-US" sz="1100" b="0" dirty="0">
+                        <a:solidFill>
+                          <a:schemeClr val="tx1">
+                            <a:lumMod val="50000"/>
+                            <a:lumOff val="50000"/>
+                          </a:schemeClr>
+                        </a:solidFill>
+                        <a:latin typeface="Consolas" pitchFamily="49" charset="0"/>
+                        <a:cs typeface="Consolas" pitchFamily="49" charset="0"/>
+                      </a:endParaRPr>
+                    </a:p>
+                  </a:txBody>
+                  <a:tcPr/>
+                </a:tc>
+                <a:tc>
+                  <a:txBody>
+                    <a:bodyPr/>
+                    <a:lstStyle/>
+                    <a:p>
+                      <a:r>
+                        <a:rPr lang="en-US" sz="1100" b="0" dirty="0" err="1" smtClean="0">
+                          <a:latin typeface="Consolas" pitchFamily="49" charset="0"/>
+                          <a:cs typeface="Consolas" pitchFamily="49" charset="0"/>
+                        </a:rPr>
+                        <a:t>EmitLoad</a:t>
+                      </a:r>
+                      <a:endParaRPr lang="en-US" sz="1100" b="0" dirty="0">
+                        <a:latin typeface="Consolas" pitchFamily="49" charset="0"/>
+                        <a:cs typeface="Consolas" pitchFamily="49" charset="0"/>
+                      </a:endParaRPr>
+                    </a:p>
+                  </a:txBody>
+                  <a:tcPr/>
+                </a:tc>
+                <a:tc>
+                  <a:txBody>
+                    <a:bodyPr/>
+                    <a:lstStyle/>
+                    <a:p>
+                      <a:r>
+                        <a:rPr lang="en-US" sz="1100" b="1" dirty="0" smtClean="0">
+                          <a:latin typeface="Consolas" pitchFamily="49" charset="0"/>
+                          <a:cs typeface="Consolas" pitchFamily="49" charset="0"/>
+                        </a:rPr>
+                        <a:t>ldarg.2</a:t>
+                      </a:r>
+                      <a:endParaRPr lang="en-US" sz="1100" b="1" dirty="0">
+                        <a:latin typeface="Consolas" pitchFamily="49" charset="0"/>
+                        <a:cs typeface="Consolas" pitchFamily="49" charset="0"/>
+                      </a:endParaRPr>
+                    </a:p>
+                  </a:txBody>
+                  <a:tcPr/>
+                </a:tc>
+              </a:tr>
+              <a:tr h="274320">
+                <a:tc>
+                  <a:txBody>
+                    <a:bodyPr/>
+                    <a:lstStyle/>
+                    <a:p>
+                      <a:pPr lvl="0"/>
+                      <a:r>
+                        <a:rPr lang="en-US" sz="1100" b="0" dirty="0" smtClean="0">
+                          <a:solidFill>
+                            <a:schemeClr val="tx1"/>
+                          </a:solidFill>
+                          <a:latin typeface="+mj-lt"/>
+                          <a:cs typeface="Consolas" pitchFamily="49" charset="0"/>
+                        </a:rPr>
+                        <a:t>10</a:t>
+                      </a:r>
+                      <a:endParaRPr lang="en-US" sz="1100" b="0" dirty="0">
+                        <a:solidFill>
+                          <a:schemeClr val="tx1"/>
+                        </a:solidFill>
+                        <a:latin typeface="+mj-lt"/>
+                        <a:cs typeface="Consolas" pitchFamily="49" charset="0"/>
+                      </a:endParaRPr>
+                    </a:p>
+                  </a:txBody>
+                  <a:tcPr/>
+                </a:tc>
+                <a:tc>
+                  <a:txBody>
+                    <a:bodyPr/>
+                    <a:lstStyle/>
+                    <a:p>
+                      <a:pPr lvl="4"/>
+                      <a:r>
+                        <a:rPr lang="en-US" sz="1100" b="0" dirty="0" err="1" smtClean="0">
+                          <a:solidFill>
+                            <a:srgbClr val="C00000"/>
+                          </a:solidFill>
+                          <a:latin typeface="Consolas" pitchFamily="49" charset="0"/>
+                          <a:cs typeface="Consolas" pitchFamily="49" charset="0"/>
+                        </a:rPr>
+                        <a:t>BinaryOperators.OperatorAdd</a:t>
+                      </a:r>
+                      <a:r>
+                        <a:rPr lang="en-US" sz="1100" b="0" dirty="0" smtClean="0">
+                          <a:solidFill>
+                            <a:srgbClr val="C00000"/>
+                          </a:solidFill>
+                          <a:latin typeface="Consolas" pitchFamily="49" charset="0"/>
+                          <a:cs typeface="Consolas" pitchFamily="49" charset="0"/>
+                        </a:rPr>
+                        <a:t>&lt;</a:t>
+                      </a:r>
+                      <a:r>
+                        <a:rPr lang="en-US" sz="1100" b="0" dirty="0" err="1" smtClean="0">
+                          <a:solidFill>
+                            <a:srgbClr val="C00000"/>
+                          </a:solidFill>
+                          <a:latin typeface="Consolas" pitchFamily="49" charset="0"/>
+                          <a:cs typeface="Consolas" pitchFamily="49" charset="0"/>
+                        </a:rPr>
+                        <a:t>int</a:t>
+                      </a:r>
+                      <a:r>
+                        <a:rPr lang="en-US" sz="1100" b="0" dirty="0" smtClean="0">
+                          <a:solidFill>
+                            <a:srgbClr val="C00000"/>
+                          </a:solidFill>
+                          <a:latin typeface="Consolas" pitchFamily="49" charset="0"/>
+                          <a:cs typeface="Consolas" pitchFamily="49" charset="0"/>
+                        </a:rPr>
+                        <a:t>&gt;</a:t>
+                      </a:r>
+                      <a:endParaRPr lang="en-US" sz="1100" b="0" dirty="0">
+                        <a:solidFill>
+                          <a:srgbClr val="C00000"/>
+                        </a:solidFill>
+                        <a:latin typeface="Consolas" pitchFamily="49" charset="0"/>
+                        <a:cs typeface="Consolas" pitchFamily="49" charset="0"/>
+                      </a:endParaRPr>
+                    </a:p>
+                  </a:txBody>
+                  <a:tcPr/>
+                </a:tc>
+                <a:tc>
+                  <a:txBody>
+                    <a:bodyPr/>
+                    <a:lstStyle/>
+                    <a:p>
+                      <a:endParaRPr lang="en-US" sz="1100" b="0" dirty="0">
+                        <a:latin typeface="Consolas" pitchFamily="49" charset="0"/>
+                        <a:cs typeface="Consolas" pitchFamily="49" charset="0"/>
+                      </a:endParaRPr>
+                    </a:p>
+                  </a:txBody>
+                  <a:tcPr/>
+                </a:tc>
+                <a:tc>
+                  <a:txBody>
+                    <a:bodyPr/>
+                    <a:lstStyle/>
+                    <a:p>
+                      <a:r>
+                        <a:rPr lang="en-US" sz="1100" b="1" dirty="0" smtClean="0">
+                          <a:latin typeface="Consolas" pitchFamily="49" charset="0"/>
+                          <a:cs typeface="Consolas" pitchFamily="49" charset="0"/>
+                        </a:rPr>
+                        <a:t>add</a:t>
+                      </a:r>
+                      <a:endParaRPr lang="en-US" sz="1100" b="1" dirty="0">
+                        <a:latin typeface="Consolas" pitchFamily="49" charset="0"/>
+                        <a:cs typeface="Consolas" pitchFamily="49" charset="0"/>
+                      </a:endParaRPr>
+                    </a:p>
+                  </a:txBody>
+                  <a:tcPr/>
+                </a:tc>
+              </a:tr>
+              <a:tr h="274320">
+                <a:tc>
+                  <a:txBody>
+                    <a:bodyPr/>
+                    <a:lstStyle/>
+                    <a:p>
+                      <a:pPr lvl="0"/>
+                      <a:r>
+                        <a:rPr lang="en-US" sz="1100" b="0" dirty="0" smtClean="0">
+                          <a:solidFill>
+                            <a:schemeClr val="tx1"/>
+                          </a:solidFill>
+                          <a:latin typeface="+mj-lt"/>
+                          <a:cs typeface="Consolas" pitchFamily="49" charset="0"/>
+                        </a:rPr>
+                        <a:t>11</a:t>
+                      </a:r>
+                      <a:endParaRPr lang="en-US" sz="1100" b="0" dirty="0">
+                        <a:solidFill>
+                          <a:schemeClr val="tx1"/>
+                        </a:solidFill>
+                        <a:latin typeface="+mj-lt"/>
+                        <a:cs typeface="Consolas" pitchFamily="49" charset="0"/>
+                      </a:endParaRPr>
+                    </a:p>
+                  </a:txBody>
+                  <a:tcPr/>
+                </a:tc>
+                <a:tc>
+                  <a:txBody>
+                    <a:bodyPr/>
+                    <a:lstStyle/>
+                    <a:p>
+                      <a:pPr lvl="2"/>
+                      <a:r>
+                        <a:rPr lang="en-US" sz="1100" b="0" dirty="0" err="1" smtClean="0">
+                          <a:solidFill>
+                            <a:srgbClr val="C00000"/>
+                          </a:solidFill>
+                          <a:latin typeface="Consolas" pitchFamily="49" charset="0"/>
+                          <a:cs typeface="Consolas" pitchFamily="49" charset="0"/>
+                        </a:rPr>
+                        <a:t>ReturnStatement</a:t>
+                      </a:r>
+                      <a:endParaRPr lang="en-US" sz="1100" b="0" dirty="0">
+                        <a:solidFill>
+                          <a:srgbClr val="C00000"/>
+                        </a:solidFill>
+                        <a:latin typeface="Consolas" pitchFamily="49" charset="0"/>
+                        <a:cs typeface="Consolas" pitchFamily="49" charset="0"/>
+                      </a:endParaRPr>
+                    </a:p>
+                  </a:txBody>
+                  <a:tcPr/>
+                </a:tc>
+                <a:tc>
+                  <a:txBody>
+                    <a:bodyPr/>
+                    <a:lstStyle/>
+                    <a:p>
+                      <a:endParaRPr lang="en-US" sz="1100" b="0" dirty="0">
+                        <a:latin typeface="Consolas" pitchFamily="49" charset="0"/>
+                        <a:cs typeface="Consolas" pitchFamily="49" charset="0"/>
+                      </a:endParaRPr>
+                    </a:p>
+                  </a:txBody>
+                  <a:tcPr/>
+                </a:tc>
+                <a:tc>
+                  <a:txBody>
+                    <a:bodyPr/>
+                    <a:lstStyle/>
+                    <a:p>
+                      <a:r>
+                        <a:rPr lang="en-US" sz="1100" b="1" dirty="0" smtClean="0">
+                          <a:latin typeface="Consolas" pitchFamily="49" charset="0"/>
+                          <a:cs typeface="Consolas" pitchFamily="49" charset="0"/>
+                        </a:rPr>
+                        <a:t>ret</a:t>
+                      </a:r>
+                      <a:endParaRPr lang="en-US" sz="1100" b="1" dirty="0">
+                        <a:latin typeface="Consolas" pitchFamily="49" charset="0"/>
+                        <a:cs typeface="Consolas" pitchFamily="49" charset="0"/>
+                      </a:endParaRPr>
                     </a:p>
                   </a:txBody>
                   <a:tcPr/>
@@ -6607,6 +8459,289 @@
           </a:graphicData>
         </a:graphic>
       </p:graphicFrame>
+      <p:sp>
+        <p:nvSpPr>
+          <p:cNvPr id="38" name="TextBox 37"/>
+          <p:cNvSpPr txBox="1"/>
+          <p:nvPr/>
+        </p:nvSpPr>
+        <p:spPr>
+          <a:xfrm>
+            <a:off x="10073896" y="6714705"/>
+            <a:ext cx="2499104" cy="1395413"/>
+          </a:xfrm>
+          <a:prstGeom prst="rect">
+            <a:avLst/>
+          </a:prstGeom>
+          <a:solidFill>
+            <a:srgbClr val="FFFFCC"/>
+          </a:solidFill>
+          <a:ln>
+            <a:solidFill>
+              <a:schemeClr val="accent3">
+                <a:lumMod val="40000"/>
+                <a:lumOff val="60000"/>
+              </a:schemeClr>
+            </a:solidFill>
+          </a:ln>
+        </p:spPr>
+        <p:txBody>
+          <a:bodyPr wrap="none" lIns="91440" rtlCol="0">
+            <a:noAutofit/>
+          </a:bodyPr>
+          <a:lstStyle/>
+          <a:p>
+            <a:r>
+              <a:rPr lang="en-US" sz="1200" dirty="0" smtClean="0">
+                <a:solidFill>
+                  <a:srgbClr val="0000CC"/>
+                </a:solidFill>
+                <a:latin typeface="Consolas" pitchFamily="49" charset="0"/>
+                <a:cs typeface="Consolas" pitchFamily="49" charset="0"/>
+              </a:rPr>
+              <a:t>.method public instance </a:t>
+            </a:r>
+            <a:r>
+              <a:rPr lang="en-US" sz="1200" dirty="0" smtClean="0">
+                <a:latin typeface="Consolas" pitchFamily="49" charset="0"/>
+                <a:cs typeface="Consolas" pitchFamily="49" charset="0"/>
+              </a:rPr>
+              <a:t/>
+            </a:r>
+            <a:br>
+              <a:rPr lang="en-US" sz="1200" dirty="0" smtClean="0">
+                <a:latin typeface="Consolas" pitchFamily="49" charset="0"/>
+                <a:cs typeface="Consolas" pitchFamily="49" charset="0"/>
+              </a:rPr>
+            </a:br>
+            <a:r>
+              <a:rPr lang="en-US" sz="1200" dirty="0" smtClean="0">
+                <a:latin typeface="Consolas" pitchFamily="49" charset="0"/>
+                <a:cs typeface="Consolas" pitchFamily="49" charset="0"/>
+              </a:rPr>
+              <a:t> </a:t>
+            </a:r>
+            <a:r>
+              <a:rPr lang="en-US" sz="1200" dirty="0" smtClean="0">
+                <a:solidFill>
+                  <a:srgbClr val="006600"/>
+                </a:solidFill>
+                <a:latin typeface="Consolas" pitchFamily="49" charset="0"/>
+                <a:cs typeface="Consolas" pitchFamily="49" charset="0"/>
+              </a:rPr>
+              <a:t>int32</a:t>
+            </a:r>
+            <a:r>
+              <a:rPr lang="en-US" sz="1200" dirty="0" smtClean="0">
+                <a:latin typeface="Consolas" pitchFamily="49" charset="0"/>
+                <a:cs typeface="Consolas" pitchFamily="49" charset="0"/>
+              </a:rPr>
+              <a:t> </a:t>
+            </a:r>
+            <a:r>
+              <a:rPr lang="en-US" sz="1200" b="1" dirty="0" smtClean="0">
+                <a:latin typeface="Consolas" pitchFamily="49" charset="0"/>
+                <a:cs typeface="Consolas" pitchFamily="49" charset="0"/>
+              </a:rPr>
+              <a:t>Add</a:t>
+            </a:r>
+            <a:r>
+              <a:rPr lang="en-US" sz="1200" dirty="0" smtClean="0">
+                <a:latin typeface="Consolas" pitchFamily="49" charset="0"/>
+                <a:cs typeface="Consolas" pitchFamily="49" charset="0"/>
+              </a:rPr>
+              <a:t>(</a:t>
+            </a:r>
+            <a:r>
+              <a:rPr lang="en-US" sz="1200" dirty="0" smtClean="0">
+                <a:solidFill>
+                  <a:srgbClr val="006600"/>
+                </a:solidFill>
+                <a:latin typeface="Consolas" pitchFamily="49" charset="0"/>
+                <a:cs typeface="Consolas" pitchFamily="49" charset="0"/>
+              </a:rPr>
+              <a:t>int32</a:t>
+            </a:r>
+            <a:r>
+              <a:rPr lang="en-US" sz="1200" dirty="0" smtClean="0">
+                <a:latin typeface="Consolas" pitchFamily="49" charset="0"/>
+                <a:cs typeface="Consolas" pitchFamily="49" charset="0"/>
+              </a:rPr>
+              <a:t> x, </a:t>
+            </a:r>
+            <a:r>
+              <a:rPr lang="en-US" sz="1200" dirty="0" smtClean="0">
+                <a:solidFill>
+                  <a:srgbClr val="006600"/>
+                </a:solidFill>
+                <a:latin typeface="Consolas" pitchFamily="49" charset="0"/>
+                <a:cs typeface="Consolas" pitchFamily="49" charset="0"/>
+              </a:rPr>
+              <a:t>int32</a:t>
+            </a:r>
+            <a:r>
+              <a:rPr lang="en-US" sz="1200" dirty="0" smtClean="0">
+                <a:latin typeface="Consolas" pitchFamily="49" charset="0"/>
+                <a:cs typeface="Consolas" pitchFamily="49" charset="0"/>
+              </a:rPr>
+              <a:t> y)</a:t>
+            </a:r>
+            <a:br>
+              <a:rPr lang="en-US" sz="1200" dirty="0" smtClean="0">
+                <a:latin typeface="Consolas" pitchFamily="49" charset="0"/>
+                <a:cs typeface="Consolas" pitchFamily="49" charset="0"/>
+              </a:rPr>
+            </a:br>
+            <a:endParaRPr lang="en-US" sz="1200" dirty="0" smtClean="0">
+              <a:latin typeface="Consolas" pitchFamily="49" charset="0"/>
+              <a:cs typeface="Consolas" pitchFamily="49" charset="0"/>
+            </a:endParaRPr>
+          </a:p>
+          <a:p>
+            <a:r>
+              <a:rPr lang="en-US" sz="1200" dirty="0" smtClean="0">
+                <a:latin typeface="Consolas" pitchFamily="49" charset="0"/>
+                <a:cs typeface="Consolas" pitchFamily="49" charset="0"/>
+              </a:rPr>
+              <a:t>L_0000: </a:t>
+            </a:r>
+            <a:r>
+              <a:rPr lang="en-US" sz="1200" dirty="0" smtClean="0">
+                <a:solidFill>
+                  <a:srgbClr val="006600"/>
+                </a:solidFill>
+                <a:latin typeface="Consolas" pitchFamily="49" charset="0"/>
+                <a:cs typeface="Consolas" pitchFamily="49" charset="0"/>
+              </a:rPr>
+              <a:t>ldarg.1</a:t>
+            </a:r>
+          </a:p>
+          <a:p>
+            <a:r>
+              <a:rPr lang="en-US" sz="1200" dirty="0" smtClean="0">
+                <a:latin typeface="Consolas" pitchFamily="49" charset="0"/>
+                <a:cs typeface="Consolas" pitchFamily="49" charset="0"/>
+              </a:rPr>
+              <a:t>L_0001: </a:t>
+            </a:r>
+            <a:r>
+              <a:rPr lang="en-US" sz="1200" dirty="0" smtClean="0">
+                <a:solidFill>
+                  <a:srgbClr val="006600"/>
+                </a:solidFill>
+                <a:latin typeface="Consolas" pitchFamily="49" charset="0"/>
+                <a:cs typeface="Consolas" pitchFamily="49" charset="0"/>
+              </a:rPr>
+              <a:t>ldarg.2</a:t>
+            </a:r>
+          </a:p>
+          <a:p>
+            <a:r>
+              <a:rPr lang="en-US" sz="1200" dirty="0" smtClean="0">
+                <a:latin typeface="Consolas" pitchFamily="49" charset="0"/>
+                <a:cs typeface="Consolas" pitchFamily="49" charset="0"/>
+              </a:rPr>
+              <a:t>L_0002: </a:t>
+            </a:r>
+            <a:r>
+              <a:rPr lang="en-US" sz="1200" dirty="0" smtClean="0">
+                <a:solidFill>
+                  <a:srgbClr val="006600"/>
+                </a:solidFill>
+                <a:latin typeface="Consolas" pitchFamily="49" charset="0"/>
+                <a:cs typeface="Consolas" pitchFamily="49" charset="0"/>
+              </a:rPr>
+              <a:t>add</a:t>
+            </a:r>
+          </a:p>
+          <a:p>
+            <a:r>
+              <a:rPr lang="en-US" sz="1200" dirty="0" smtClean="0">
+                <a:latin typeface="Consolas" pitchFamily="49" charset="0"/>
+                <a:cs typeface="Consolas" pitchFamily="49" charset="0"/>
+              </a:rPr>
+              <a:t>L_0003: </a:t>
+            </a:r>
+            <a:r>
+              <a:rPr lang="en-US" sz="1200" dirty="0" smtClean="0">
+                <a:solidFill>
+                  <a:srgbClr val="006600"/>
+                </a:solidFill>
+                <a:latin typeface="Consolas" pitchFamily="49" charset="0"/>
+                <a:cs typeface="Consolas" pitchFamily="49" charset="0"/>
+              </a:rPr>
+              <a:t>ret</a:t>
+            </a:r>
+            <a:endParaRPr lang="en-US" sz="1200" dirty="0">
+              <a:solidFill>
+                <a:srgbClr val="006600"/>
+              </a:solidFill>
+              <a:latin typeface="Consolas" pitchFamily="49" charset="0"/>
+              <a:cs typeface="Consolas" pitchFamily="49" charset="0"/>
+            </a:endParaRPr>
+          </a:p>
+        </p:txBody>
+      </p:sp>
+      <p:sp>
+        <p:nvSpPr>
+          <p:cNvPr id="39" name="TextBox 38"/>
+          <p:cNvSpPr txBox="1"/>
+          <p:nvPr/>
+        </p:nvSpPr>
+        <p:spPr>
+          <a:xfrm>
+            <a:off x="193596" y="4492109"/>
+            <a:ext cx="1749197" cy="369332"/>
+          </a:xfrm>
+          <a:prstGeom prst="rect">
+            <a:avLst/>
+          </a:prstGeom>
+          <a:noFill/>
+        </p:spPr>
+        <p:txBody>
+          <a:bodyPr wrap="none" rtlCol="0">
+            <a:spAutoFit/>
+          </a:bodyPr>
+          <a:lstStyle/>
+          <a:p>
+            <a:r>
+              <a:rPr lang="en-US" sz="1800" dirty="0" smtClean="0"/>
+              <a:t>Emit Sequence</a:t>
+            </a:r>
+            <a:endParaRPr lang="en-US" sz="1800" dirty="0"/>
+          </a:p>
+        </p:txBody>
+      </p:sp>
+      <p:sp>
+        <p:nvSpPr>
+          <p:cNvPr id="92" name="TextBox 91"/>
+          <p:cNvSpPr txBox="1"/>
+          <p:nvPr/>
+        </p:nvSpPr>
+        <p:spPr>
+          <a:xfrm>
+            <a:off x="9979580" y="6381750"/>
+            <a:ext cx="1402948" cy="369332"/>
+          </a:xfrm>
+          <a:prstGeom prst="rect">
+            <a:avLst/>
+          </a:prstGeom>
+          <a:noFill/>
+        </p:spPr>
+        <p:txBody>
+          <a:bodyPr wrap="none" rtlCol="0">
+            <a:spAutoFit/>
+          </a:bodyPr>
+          <a:lstStyle/>
+          <a:p>
+            <a:r>
+              <a:rPr lang="en-US" sz="1800" dirty="0" smtClean="0"/>
+              <a:t>Resulting IL</a:t>
+            </a:r>
+            <a:endParaRPr lang="en-US" sz="1800" dirty="0"/>
+          </a:p>
+        </p:txBody>
+      </p:sp>
     </p:spTree>
     <p:extLst>
       <p:ext uri="{BB962C8B-B14F-4D97-AF65-F5344CB8AC3E}">

</xml_diff>